<commit_message>
finish task2 in buffer lab.
</commit_message>
<xml_diff>
--- a/my-solution/4-Buffer-Lab-IA32/buflab32-handout/buflab-handout/stackVisual.pptx
+++ b/my-solution/4-Buffer-Lab-IA32/buflab32-handout/buflab-handout/stackVisual.pptx
@@ -6,6 +6,7 @@
   </p:sldMasterIdLst>
   <p:sldIdLst>
     <p:sldId id="256" r:id="rId3"/>
+    <p:sldId id="257" r:id="rId4"/>
   </p:sldIdLst>
   <p:sldSz cx="10080625" cy="5670550"/>
   <p:notesSz cx="7559675" cy="10691812"/>
@@ -53,7 +54,7 @@
       </p:grpSpPr>
       <p:sp>
         <p:nvSpPr>
-          <p:cNvPr id="26" name="PlaceHolder 1"/>
+          <p:cNvPr id="23" name="PlaceHolder 1"/>
           <p:cNvSpPr>
             <a:spLocks noGrp="1"/>
           </p:cNvSpPr>
@@ -64,7 +65,7 @@
         <p:spPr>
           <a:xfrm>
             <a:off x="504000" y="226080"/>
-            <a:ext cx="9071640" cy="946440"/>
+            <a:ext cx="9071280" cy="946080"/>
           </a:xfrm>
           <a:prstGeom prst="rect">
             <a:avLst/>
@@ -84,7 +85,7 @@
       </p:sp>
       <p:sp>
         <p:nvSpPr>
-          <p:cNvPr id="27" name="PlaceHolder 2"/>
+          <p:cNvPr id="24" name="PlaceHolder 2"/>
           <p:cNvSpPr>
             <a:spLocks noGrp="1"/>
           </p:cNvSpPr>
@@ -95,7 +96,7 @@
         <p:spPr>
           <a:xfrm>
             <a:off x="504000" y="1326600"/>
-            <a:ext cx="9071640" cy="1568160"/>
+            <a:ext cx="9072000" cy="1568520"/>
           </a:xfrm>
           <a:prstGeom prst="rect">
             <a:avLst/>
@@ -114,7 +115,7 @@
       </p:sp>
       <p:sp>
         <p:nvSpPr>
-          <p:cNvPr id="28" name="PlaceHolder 3"/>
+          <p:cNvPr id="25" name="PlaceHolder 3"/>
           <p:cNvSpPr>
             <a:spLocks noGrp="1"/>
           </p:cNvSpPr>
@@ -124,8 +125,8 @@
         </p:nvSpPr>
         <p:spPr>
           <a:xfrm>
-            <a:off x="504000" y="3044160"/>
-            <a:ext cx="9071640" cy="1568160"/>
+            <a:off x="504000" y="3044520"/>
+            <a:ext cx="9072000" cy="1568520"/>
           </a:xfrm>
           <a:prstGeom prst="rect">
             <a:avLst/>
@@ -166,7 +167,7 @@
       </p:grpSpPr>
       <p:sp>
         <p:nvSpPr>
-          <p:cNvPr id="29" name="PlaceHolder 1"/>
+          <p:cNvPr id="26" name="PlaceHolder 1"/>
           <p:cNvSpPr>
             <a:spLocks noGrp="1"/>
           </p:cNvSpPr>
@@ -177,7 +178,7 @@
         <p:spPr>
           <a:xfrm>
             <a:off x="504000" y="226080"/>
-            <a:ext cx="9071640" cy="946440"/>
+            <a:ext cx="9071280" cy="946080"/>
           </a:xfrm>
           <a:prstGeom prst="rect">
             <a:avLst/>
@@ -197,7 +198,7 @@
       </p:sp>
       <p:sp>
         <p:nvSpPr>
-          <p:cNvPr id="30" name="PlaceHolder 2"/>
+          <p:cNvPr id="27" name="PlaceHolder 2"/>
           <p:cNvSpPr>
             <a:spLocks noGrp="1"/>
           </p:cNvSpPr>
@@ -208,7 +209,7 @@
         <p:spPr>
           <a:xfrm>
             <a:off x="504000" y="1326600"/>
-            <a:ext cx="4426920" cy="1568160"/>
+            <a:ext cx="4426920" cy="1568520"/>
           </a:xfrm>
           <a:prstGeom prst="rect">
             <a:avLst/>
@@ -227,7 +228,7 @@
       </p:sp>
       <p:sp>
         <p:nvSpPr>
-          <p:cNvPr id="31" name="PlaceHolder 3"/>
+          <p:cNvPr id="28" name="PlaceHolder 3"/>
           <p:cNvSpPr>
             <a:spLocks noGrp="1"/>
           </p:cNvSpPr>
@@ -238,7 +239,7 @@
         <p:spPr>
           <a:xfrm>
             <a:off x="5152680" y="1326600"/>
-            <a:ext cx="4426920" cy="1568160"/>
+            <a:ext cx="4426920" cy="1568520"/>
           </a:xfrm>
           <a:prstGeom prst="rect">
             <a:avLst/>
@@ -257,7 +258,7 @@
       </p:sp>
       <p:sp>
         <p:nvSpPr>
-          <p:cNvPr id="32" name="PlaceHolder 4"/>
+          <p:cNvPr id="29" name="PlaceHolder 4"/>
           <p:cNvSpPr>
             <a:spLocks noGrp="1"/>
           </p:cNvSpPr>
@@ -267,8 +268,8 @@
         </p:nvSpPr>
         <p:spPr>
           <a:xfrm>
-            <a:off x="504000" y="3044160"/>
-            <a:ext cx="4426920" cy="1568160"/>
+            <a:off x="504000" y="3044520"/>
+            <a:ext cx="4426920" cy="1568520"/>
           </a:xfrm>
           <a:prstGeom prst="rect">
             <a:avLst/>
@@ -287,7 +288,7 @@
       </p:sp>
       <p:sp>
         <p:nvSpPr>
-          <p:cNvPr id="33" name="PlaceHolder 5"/>
+          <p:cNvPr id="30" name="PlaceHolder 5"/>
           <p:cNvSpPr>
             <a:spLocks noGrp="1"/>
           </p:cNvSpPr>
@@ -297,8 +298,8 @@
         </p:nvSpPr>
         <p:spPr>
           <a:xfrm>
-            <a:off x="5152680" y="3044160"/>
-            <a:ext cx="4426920" cy="1568160"/>
+            <a:off x="5152680" y="3044520"/>
+            <a:ext cx="4426920" cy="1568520"/>
           </a:xfrm>
           <a:prstGeom prst="rect">
             <a:avLst/>
@@ -339,7 +340,7 @@
       </p:grpSpPr>
       <p:sp>
         <p:nvSpPr>
-          <p:cNvPr id="34" name="PlaceHolder 1"/>
+          <p:cNvPr id="31" name="PlaceHolder 1"/>
           <p:cNvSpPr>
             <a:spLocks noGrp="1"/>
           </p:cNvSpPr>
@@ -350,7 +351,7 @@
         <p:spPr>
           <a:xfrm>
             <a:off x="504000" y="226080"/>
-            <a:ext cx="9071640" cy="946440"/>
+            <a:ext cx="9071280" cy="946080"/>
           </a:xfrm>
           <a:prstGeom prst="rect">
             <a:avLst/>
@@ -370,7 +371,7 @@
       </p:sp>
       <p:sp>
         <p:nvSpPr>
-          <p:cNvPr id="35" name="PlaceHolder 2"/>
+          <p:cNvPr id="32" name="PlaceHolder 2"/>
           <p:cNvSpPr>
             <a:spLocks noGrp="1"/>
           </p:cNvSpPr>
@@ -381,7 +382,7 @@
         <p:spPr>
           <a:xfrm>
             <a:off x="504000" y="1326600"/>
-            <a:ext cx="2920680" cy="1568160"/>
+            <a:ext cx="2921040" cy="1568520"/>
           </a:xfrm>
           <a:prstGeom prst="rect">
             <a:avLst/>
@@ -400,7 +401,7 @@
       </p:sp>
       <p:sp>
         <p:nvSpPr>
-          <p:cNvPr id="36" name="PlaceHolder 3"/>
+          <p:cNvPr id="33" name="PlaceHolder 3"/>
           <p:cNvSpPr>
             <a:spLocks noGrp="1"/>
           </p:cNvSpPr>
@@ -410,8 +411,8 @@
         </p:nvSpPr>
         <p:spPr>
           <a:xfrm>
-            <a:off x="3571200" y="1326600"/>
-            <a:ext cx="2920680" cy="1568160"/>
+            <a:off x="3571560" y="1326600"/>
+            <a:ext cx="2921040" cy="1568520"/>
           </a:xfrm>
           <a:prstGeom prst="rect">
             <a:avLst/>
@@ -430,7 +431,7 @@
       </p:sp>
       <p:sp>
         <p:nvSpPr>
-          <p:cNvPr id="37" name="PlaceHolder 4"/>
+          <p:cNvPr id="34" name="PlaceHolder 4"/>
           <p:cNvSpPr>
             <a:spLocks noGrp="1"/>
           </p:cNvSpPr>
@@ -440,8 +441,8 @@
         </p:nvSpPr>
         <p:spPr>
           <a:xfrm>
-            <a:off x="6638040" y="1326600"/>
-            <a:ext cx="2920680" cy="1568160"/>
+            <a:off x="6639120" y="1326600"/>
+            <a:ext cx="2921040" cy="1568520"/>
           </a:xfrm>
           <a:prstGeom prst="rect">
             <a:avLst/>
@@ -460,7 +461,7 @@
       </p:sp>
       <p:sp>
         <p:nvSpPr>
-          <p:cNvPr id="38" name="PlaceHolder 5"/>
+          <p:cNvPr id="35" name="PlaceHolder 5"/>
           <p:cNvSpPr>
             <a:spLocks noGrp="1"/>
           </p:cNvSpPr>
@@ -470,8 +471,8 @@
         </p:nvSpPr>
         <p:spPr>
           <a:xfrm>
-            <a:off x="504000" y="3044160"/>
-            <a:ext cx="2920680" cy="1568160"/>
+            <a:off x="504000" y="3044520"/>
+            <a:ext cx="2921040" cy="1568520"/>
           </a:xfrm>
           <a:prstGeom prst="rect">
             <a:avLst/>
@@ -490,7 +491,7 @@
       </p:sp>
       <p:sp>
         <p:nvSpPr>
-          <p:cNvPr id="39" name="PlaceHolder 6"/>
+          <p:cNvPr id="36" name="PlaceHolder 6"/>
           <p:cNvSpPr>
             <a:spLocks noGrp="1"/>
           </p:cNvSpPr>
@@ -500,8 +501,8 @@
         </p:nvSpPr>
         <p:spPr>
           <a:xfrm>
-            <a:off x="3571200" y="3044160"/>
-            <a:ext cx="2920680" cy="1568160"/>
+            <a:off x="3571560" y="3044520"/>
+            <a:ext cx="2921040" cy="1568520"/>
           </a:xfrm>
           <a:prstGeom prst="rect">
             <a:avLst/>
@@ -520,7 +521,7 @@
       </p:sp>
       <p:sp>
         <p:nvSpPr>
-          <p:cNvPr id="40" name="PlaceHolder 7"/>
+          <p:cNvPr id="37" name="PlaceHolder 7"/>
           <p:cNvSpPr>
             <a:spLocks noGrp="1"/>
           </p:cNvSpPr>
@@ -530,8 +531,8 @@
         </p:nvSpPr>
         <p:spPr>
           <a:xfrm>
-            <a:off x="6638040" y="3044160"/>
-            <a:ext cx="2920680" cy="1568160"/>
+            <a:off x="6639120" y="3044520"/>
+            <a:ext cx="2921040" cy="1568520"/>
           </a:xfrm>
           <a:prstGeom prst="rect">
             <a:avLst/>
@@ -572,7 +573,7 @@
       </p:grpSpPr>
       <p:sp>
         <p:nvSpPr>
-          <p:cNvPr id="5" name="PlaceHolder 1"/>
+          <p:cNvPr id="2" name="PlaceHolder 1"/>
           <p:cNvSpPr>
             <a:spLocks noGrp="1"/>
           </p:cNvSpPr>
@@ -583,7 +584,7 @@
         <p:spPr>
           <a:xfrm>
             <a:off x="504000" y="226080"/>
-            <a:ext cx="9071640" cy="946440"/>
+            <a:ext cx="9071280" cy="946080"/>
           </a:xfrm>
           <a:prstGeom prst="rect">
             <a:avLst/>
@@ -603,7 +604,7 @@
       </p:sp>
       <p:sp>
         <p:nvSpPr>
-          <p:cNvPr id="6" name="PlaceHolder 2"/>
+          <p:cNvPr id="3" name="PlaceHolder 2"/>
           <p:cNvSpPr>
             <a:spLocks noGrp="1"/>
           </p:cNvSpPr>
@@ -614,7 +615,7 @@
         <p:spPr>
           <a:xfrm>
             <a:off x="504000" y="1326600"/>
-            <a:ext cx="9071640" cy="3288240"/>
+            <a:ext cx="9072000" cy="3288600"/>
           </a:xfrm>
           <a:prstGeom prst="rect">
             <a:avLst/>
@@ -656,7 +657,7 @@
       </p:grpSpPr>
       <p:sp>
         <p:nvSpPr>
-          <p:cNvPr id="7" name="PlaceHolder 1"/>
+          <p:cNvPr id="4" name="PlaceHolder 1"/>
           <p:cNvSpPr>
             <a:spLocks noGrp="1"/>
           </p:cNvSpPr>
@@ -667,7 +668,7 @@
         <p:spPr>
           <a:xfrm>
             <a:off x="504000" y="226080"/>
-            <a:ext cx="9071640" cy="946440"/>
+            <a:ext cx="9071280" cy="946080"/>
           </a:xfrm>
           <a:prstGeom prst="rect">
             <a:avLst/>
@@ -687,7 +688,7 @@
       </p:sp>
       <p:sp>
         <p:nvSpPr>
-          <p:cNvPr id="8" name="PlaceHolder 2"/>
+          <p:cNvPr id="5" name="PlaceHolder 2"/>
           <p:cNvSpPr>
             <a:spLocks noGrp="1"/>
           </p:cNvSpPr>
@@ -698,7 +699,7 @@
         <p:spPr>
           <a:xfrm>
             <a:off x="504000" y="1326600"/>
-            <a:ext cx="9071640" cy="3288240"/>
+            <a:ext cx="9072000" cy="3288600"/>
           </a:xfrm>
           <a:prstGeom prst="rect">
             <a:avLst/>
@@ -739,7 +740,7 @@
       </p:grpSpPr>
       <p:sp>
         <p:nvSpPr>
-          <p:cNvPr id="9" name="PlaceHolder 1"/>
+          <p:cNvPr id="6" name="PlaceHolder 1"/>
           <p:cNvSpPr>
             <a:spLocks noGrp="1"/>
           </p:cNvSpPr>
@@ -750,7 +751,7 @@
         <p:spPr>
           <a:xfrm>
             <a:off x="504000" y="226080"/>
-            <a:ext cx="9071640" cy="946440"/>
+            <a:ext cx="9071280" cy="946080"/>
           </a:xfrm>
           <a:prstGeom prst="rect">
             <a:avLst/>
@@ -770,7 +771,7 @@
       </p:sp>
       <p:sp>
         <p:nvSpPr>
-          <p:cNvPr id="10" name="PlaceHolder 2"/>
+          <p:cNvPr id="7" name="PlaceHolder 2"/>
           <p:cNvSpPr>
             <a:spLocks noGrp="1"/>
           </p:cNvSpPr>
@@ -781,7 +782,7 @@
         <p:spPr>
           <a:xfrm>
             <a:off x="504000" y="1326600"/>
-            <a:ext cx="4426920" cy="3288240"/>
+            <a:ext cx="4426920" cy="3288600"/>
           </a:xfrm>
           <a:prstGeom prst="rect">
             <a:avLst/>
@@ -800,7 +801,7 @@
       </p:sp>
       <p:sp>
         <p:nvSpPr>
-          <p:cNvPr id="11" name="PlaceHolder 3"/>
+          <p:cNvPr id="8" name="PlaceHolder 3"/>
           <p:cNvSpPr>
             <a:spLocks noGrp="1"/>
           </p:cNvSpPr>
@@ -811,7 +812,7 @@
         <p:spPr>
           <a:xfrm>
             <a:off x="5152680" y="1326600"/>
-            <a:ext cx="4426920" cy="3288240"/>
+            <a:ext cx="4426920" cy="3288600"/>
           </a:xfrm>
           <a:prstGeom prst="rect">
             <a:avLst/>
@@ -852,7 +853,7 @@
       </p:grpSpPr>
       <p:sp>
         <p:nvSpPr>
-          <p:cNvPr id="12" name="PlaceHolder 1"/>
+          <p:cNvPr id="9" name="PlaceHolder 1"/>
           <p:cNvSpPr>
             <a:spLocks noGrp="1"/>
           </p:cNvSpPr>
@@ -863,7 +864,7 @@
         <p:spPr>
           <a:xfrm>
             <a:off x="504000" y="226080"/>
-            <a:ext cx="9071640" cy="946440"/>
+            <a:ext cx="9071280" cy="946080"/>
           </a:xfrm>
           <a:prstGeom prst="rect">
             <a:avLst/>
@@ -905,7 +906,7 @@
       </p:grpSpPr>
       <p:sp>
         <p:nvSpPr>
-          <p:cNvPr id="13" name="PlaceHolder 1"/>
+          <p:cNvPr id="10" name="PlaceHolder 1"/>
           <p:cNvSpPr>
             <a:spLocks noGrp="1"/>
           </p:cNvSpPr>
@@ -916,7 +917,7 @@
         <p:spPr>
           <a:xfrm>
             <a:off x="504000" y="226080"/>
-            <a:ext cx="9071640" cy="4388400"/>
+            <a:ext cx="9071280" cy="4386600"/>
           </a:xfrm>
           <a:prstGeom prst="rect">
             <a:avLst/>
@@ -958,7 +959,7 @@
       </p:grpSpPr>
       <p:sp>
         <p:nvSpPr>
-          <p:cNvPr id="14" name="PlaceHolder 1"/>
+          <p:cNvPr id="11" name="PlaceHolder 1"/>
           <p:cNvSpPr>
             <a:spLocks noGrp="1"/>
           </p:cNvSpPr>
@@ -969,7 +970,7 @@
         <p:spPr>
           <a:xfrm>
             <a:off x="504000" y="226080"/>
-            <a:ext cx="9071640" cy="946440"/>
+            <a:ext cx="9071280" cy="946080"/>
           </a:xfrm>
           <a:prstGeom prst="rect">
             <a:avLst/>
@@ -989,7 +990,7 @@
       </p:sp>
       <p:sp>
         <p:nvSpPr>
-          <p:cNvPr id="15" name="PlaceHolder 2"/>
+          <p:cNvPr id="12" name="PlaceHolder 2"/>
           <p:cNvSpPr>
             <a:spLocks noGrp="1"/>
           </p:cNvSpPr>
@@ -1000,7 +1001,7 @@
         <p:spPr>
           <a:xfrm>
             <a:off x="504000" y="1326600"/>
-            <a:ext cx="4426920" cy="1568160"/>
+            <a:ext cx="4426920" cy="1568520"/>
           </a:xfrm>
           <a:prstGeom prst="rect">
             <a:avLst/>
@@ -1019,7 +1020,7 @@
       </p:sp>
       <p:sp>
         <p:nvSpPr>
-          <p:cNvPr id="16" name="PlaceHolder 3"/>
+          <p:cNvPr id="13" name="PlaceHolder 3"/>
           <p:cNvSpPr>
             <a:spLocks noGrp="1"/>
           </p:cNvSpPr>
@@ -1030,7 +1031,7 @@
         <p:spPr>
           <a:xfrm>
             <a:off x="5152680" y="1326600"/>
-            <a:ext cx="4426920" cy="3288240"/>
+            <a:ext cx="4426920" cy="3288600"/>
           </a:xfrm>
           <a:prstGeom prst="rect">
             <a:avLst/>
@@ -1049,7 +1050,7 @@
       </p:sp>
       <p:sp>
         <p:nvSpPr>
-          <p:cNvPr id="17" name="PlaceHolder 4"/>
+          <p:cNvPr id="14" name="PlaceHolder 4"/>
           <p:cNvSpPr>
             <a:spLocks noGrp="1"/>
           </p:cNvSpPr>
@@ -1059,8 +1060,8 @@
         </p:nvSpPr>
         <p:spPr>
           <a:xfrm>
-            <a:off x="504000" y="3044160"/>
-            <a:ext cx="4426920" cy="1568160"/>
+            <a:off x="504000" y="3044520"/>
+            <a:ext cx="4426920" cy="1568520"/>
           </a:xfrm>
           <a:prstGeom prst="rect">
             <a:avLst/>
@@ -1101,7 +1102,7 @@
       </p:grpSpPr>
       <p:sp>
         <p:nvSpPr>
-          <p:cNvPr id="18" name="PlaceHolder 1"/>
+          <p:cNvPr id="15" name="PlaceHolder 1"/>
           <p:cNvSpPr>
             <a:spLocks noGrp="1"/>
           </p:cNvSpPr>
@@ -1112,7 +1113,7 @@
         <p:spPr>
           <a:xfrm>
             <a:off x="504000" y="226080"/>
-            <a:ext cx="9071640" cy="946440"/>
+            <a:ext cx="9071280" cy="946080"/>
           </a:xfrm>
           <a:prstGeom prst="rect">
             <a:avLst/>
@@ -1132,7 +1133,7 @@
       </p:sp>
       <p:sp>
         <p:nvSpPr>
-          <p:cNvPr id="19" name="PlaceHolder 2"/>
+          <p:cNvPr id="16" name="PlaceHolder 2"/>
           <p:cNvSpPr>
             <a:spLocks noGrp="1"/>
           </p:cNvSpPr>
@@ -1143,7 +1144,7 @@
         <p:spPr>
           <a:xfrm>
             <a:off x="504000" y="1326600"/>
-            <a:ext cx="4426920" cy="3288240"/>
+            <a:ext cx="4426920" cy="3288600"/>
           </a:xfrm>
           <a:prstGeom prst="rect">
             <a:avLst/>
@@ -1162,7 +1163,7 @@
       </p:sp>
       <p:sp>
         <p:nvSpPr>
-          <p:cNvPr id="20" name="PlaceHolder 3"/>
+          <p:cNvPr id="17" name="PlaceHolder 3"/>
           <p:cNvSpPr>
             <a:spLocks noGrp="1"/>
           </p:cNvSpPr>
@@ -1173,7 +1174,7 @@
         <p:spPr>
           <a:xfrm>
             <a:off x="5152680" y="1326600"/>
-            <a:ext cx="4426920" cy="1568160"/>
+            <a:ext cx="4426920" cy="1568520"/>
           </a:xfrm>
           <a:prstGeom prst="rect">
             <a:avLst/>
@@ -1192,7 +1193,7 @@
       </p:sp>
       <p:sp>
         <p:nvSpPr>
-          <p:cNvPr id="21" name="PlaceHolder 4"/>
+          <p:cNvPr id="18" name="PlaceHolder 4"/>
           <p:cNvSpPr>
             <a:spLocks noGrp="1"/>
           </p:cNvSpPr>
@@ -1202,8 +1203,8 @@
         </p:nvSpPr>
         <p:spPr>
           <a:xfrm>
-            <a:off x="5152680" y="3044160"/>
-            <a:ext cx="4426920" cy="1568160"/>
+            <a:off x="5152680" y="3044520"/>
+            <a:ext cx="4426920" cy="1568520"/>
           </a:xfrm>
           <a:prstGeom prst="rect">
             <a:avLst/>
@@ -1244,7 +1245,7 @@
       </p:grpSpPr>
       <p:sp>
         <p:nvSpPr>
-          <p:cNvPr id="22" name="PlaceHolder 1"/>
+          <p:cNvPr id="19" name="PlaceHolder 1"/>
           <p:cNvSpPr>
             <a:spLocks noGrp="1"/>
           </p:cNvSpPr>
@@ -1255,7 +1256,7 @@
         <p:spPr>
           <a:xfrm>
             <a:off x="504000" y="226080"/>
-            <a:ext cx="9071640" cy="946440"/>
+            <a:ext cx="9071280" cy="946080"/>
           </a:xfrm>
           <a:prstGeom prst="rect">
             <a:avLst/>
@@ -1275,7 +1276,7 @@
       </p:sp>
       <p:sp>
         <p:nvSpPr>
-          <p:cNvPr id="23" name="PlaceHolder 2"/>
+          <p:cNvPr id="20" name="PlaceHolder 2"/>
           <p:cNvSpPr>
             <a:spLocks noGrp="1"/>
           </p:cNvSpPr>
@@ -1286,7 +1287,7 @@
         <p:spPr>
           <a:xfrm>
             <a:off x="504000" y="1326600"/>
-            <a:ext cx="4426920" cy="1568160"/>
+            <a:ext cx="4426920" cy="1568520"/>
           </a:xfrm>
           <a:prstGeom prst="rect">
             <a:avLst/>
@@ -1305,7 +1306,7 @@
       </p:sp>
       <p:sp>
         <p:nvSpPr>
-          <p:cNvPr id="24" name="PlaceHolder 3"/>
+          <p:cNvPr id="21" name="PlaceHolder 3"/>
           <p:cNvSpPr>
             <a:spLocks noGrp="1"/>
           </p:cNvSpPr>
@@ -1316,7 +1317,7 @@
         <p:spPr>
           <a:xfrm>
             <a:off x="5152680" y="1326600"/>
-            <a:ext cx="4426920" cy="1568160"/>
+            <a:ext cx="4426920" cy="1568520"/>
           </a:xfrm>
           <a:prstGeom prst="rect">
             <a:avLst/>
@@ -1335,7 +1336,7 @@
       </p:sp>
       <p:sp>
         <p:nvSpPr>
-          <p:cNvPr id="25" name="PlaceHolder 4"/>
+          <p:cNvPr id="22" name="PlaceHolder 4"/>
           <p:cNvSpPr>
             <a:spLocks noGrp="1"/>
           </p:cNvSpPr>
@@ -1345,8 +1346,8 @@
         </p:nvSpPr>
         <p:spPr>
           <a:xfrm>
-            <a:off x="504000" y="3044160"/>
-            <a:ext cx="9071640" cy="1568160"/>
+            <a:off x="504000" y="3044520"/>
+            <a:ext cx="9072000" cy="1568520"/>
           </a:xfrm>
           <a:prstGeom prst="rect">
             <a:avLst/>
@@ -1398,7 +1399,7 @@
         <p:spPr>
           <a:xfrm>
             <a:off x="504000" y="226080"/>
-            <a:ext cx="9071640" cy="946440"/>
+            <a:ext cx="9071280" cy="946080"/>
           </a:xfrm>
           <a:prstGeom prst="rect">
             <a:avLst/>
@@ -1409,14 +1410,13 @@
             <a:noAutofit/>
           </a:bodyPr>
           <a:p>
-            <a:pPr algn="ctr"/>
-            <a:r>
-              <a:rPr b="0" lang="zh-CN" sz="4400" spc="-1" strike="noStrike">
+            <a:r>
+              <a:rPr b="0" lang="zh-CN" sz="1800" spc="-1" strike="noStrike">
                 <a:latin typeface="Arial"/>
               </a:rPr>
               <a:t>点击鼠标编辑标题文字格式</a:t>
             </a:r>
-            <a:endParaRPr b="0" lang="en-US" sz="4400" spc="-1" strike="noStrike">
+            <a:endParaRPr b="0" lang="en-US" sz="1800" spc="-1" strike="noStrike">
               <a:latin typeface="Arial"/>
             </a:endParaRPr>
           </a:p>
@@ -1435,7 +1435,7 @@
         <p:spPr>
           <a:xfrm>
             <a:off x="504000" y="1326600"/>
-            <a:ext cx="9071640" cy="3288240"/>
+            <a:ext cx="9072000" cy="3288600"/>
           </a:xfrm>
           <a:prstGeom prst="rect">
             <a:avLst/>
@@ -1597,116 +1597,6 @@
             </a:r>
             <a:endParaRPr b="0" lang="en-US" sz="2000" spc="-1" strike="noStrike">
               <a:latin typeface="Arial"/>
-            </a:endParaRPr>
-          </a:p>
-        </p:txBody>
-      </p:sp>
-      <p:sp>
-        <p:nvSpPr>
-          <p:cNvPr id="2" name="PlaceHolder 3"/>
-          <p:cNvSpPr>
-            <a:spLocks noGrp="1"/>
-          </p:cNvSpPr>
-          <p:nvPr>
-            <p:ph type="dt"/>
-          </p:nvPr>
-        </p:nvSpPr>
-        <p:spPr>
-          <a:xfrm>
-            <a:off x="504000" y="5165280"/>
-            <a:ext cx="2348280" cy="390600"/>
-          </a:xfrm>
-          <a:prstGeom prst="rect">
-            <a:avLst/>
-          </a:prstGeom>
-        </p:spPr>
-        <p:txBody>
-          <a:bodyPr lIns="0" rIns="0" tIns="0" bIns="0">
-            <a:noAutofit/>
-          </a:bodyPr>
-          <a:p>
-            <a:r>
-              <a:rPr b="0" lang="en-US" sz="1400" spc="-1" strike="noStrike">
-                <a:latin typeface="Times New Roman"/>
-              </a:rPr>
-              <a:t>&lt;日期/时间&gt;</a:t>
-            </a:r>
-            <a:endParaRPr b="0" lang="en-US" sz="1400" spc="-1" strike="noStrike">
-              <a:latin typeface="Times New Roman"/>
-            </a:endParaRPr>
-          </a:p>
-        </p:txBody>
-      </p:sp>
-      <p:sp>
-        <p:nvSpPr>
-          <p:cNvPr id="3" name="PlaceHolder 4"/>
-          <p:cNvSpPr>
-            <a:spLocks noGrp="1"/>
-          </p:cNvSpPr>
-          <p:nvPr>
-            <p:ph type="ftr"/>
-          </p:nvPr>
-        </p:nvSpPr>
-        <p:spPr>
-          <a:xfrm>
-            <a:off x="3447360" y="5165280"/>
-            <a:ext cx="3195000" cy="390600"/>
-          </a:xfrm>
-          <a:prstGeom prst="rect">
-            <a:avLst/>
-          </a:prstGeom>
-        </p:spPr>
-        <p:txBody>
-          <a:bodyPr lIns="0" rIns="0" tIns="0" bIns="0">
-            <a:noAutofit/>
-          </a:bodyPr>
-          <a:p>
-            <a:pPr algn="ctr"/>
-            <a:r>
-              <a:rPr b="0" lang="en-US" sz="1400" spc="-1" strike="noStrike">
-                <a:latin typeface="Times New Roman"/>
-              </a:rPr>
-              <a:t>&lt;页脚&gt;</a:t>
-            </a:r>
-            <a:endParaRPr b="0" lang="en-US" sz="1400" spc="-1" strike="noStrike">
-              <a:latin typeface="Times New Roman"/>
-            </a:endParaRPr>
-          </a:p>
-        </p:txBody>
-      </p:sp>
-      <p:sp>
-        <p:nvSpPr>
-          <p:cNvPr id="4" name="PlaceHolder 5"/>
-          <p:cNvSpPr>
-            <a:spLocks noGrp="1"/>
-          </p:cNvSpPr>
-          <p:nvPr>
-            <p:ph type="sldNum"/>
-          </p:nvPr>
-        </p:nvSpPr>
-        <p:spPr>
-          <a:xfrm>
-            <a:off x="7227360" y="5165280"/>
-            <a:ext cx="2348280" cy="390600"/>
-          </a:xfrm>
-          <a:prstGeom prst="rect">
-            <a:avLst/>
-          </a:prstGeom>
-        </p:spPr>
-        <p:txBody>
-          <a:bodyPr lIns="0" rIns="0" tIns="0" bIns="0">
-            <a:noAutofit/>
-          </a:bodyPr>
-          <a:p>
-            <a:pPr algn="r"/>
-            <a:fld id="{9BDCA5D2-037B-4D14-98DF-8251F970C173}" type="slidenum">
-              <a:rPr b="0" lang="en-US" sz="1400" spc="-1" strike="noStrike">
-                <a:latin typeface="Times New Roman"/>
-              </a:rPr>
-              <a:t>&lt;编号&gt;</a:t>
-            </a:fld>
-            <a:endParaRPr b="0" lang="en-US" sz="1400" spc="-1" strike="noStrike">
-              <a:latin typeface="Times New Roman"/>
             </a:endParaRPr>
           </a:p>
         </p:txBody>
@@ -1750,14 +1640,14 @@
       </p:grpSpPr>
       <p:sp>
         <p:nvSpPr>
-          <p:cNvPr id="41" name="Rectangle 3_1"/>
+          <p:cNvPr id="38" name="Rectangle 3_1"/>
           <p:cNvSpPr/>
           <p:nvPr/>
         </p:nvSpPr>
         <p:spPr>
           <a:xfrm>
             <a:off x="1980000" y="1848600"/>
-            <a:ext cx="2160000" cy="473760"/>
+            <a:ext cx="2159640" cy="473400"/>
           </a:xfrm>
           <a:prstGeom prst="rect">
             <a:avLst/>
@@ -1823,14 +1713,14 @@
       </p:sp>
       <p:sp>
         <p:nvSpPr>
-          <p:cNvPr id="42" name="Rectangle 4_1"/>
+          <p:cNvPr id="39" name="Rectangle 4_1"/>
           <p:cNvSpPr/>
           <p:nvPr/>
         </p:nvSpPr>
         <p:spPr>
           <a:xfrm>
             <a:off x="1980000" y="2743920"/>
-            <a:ext cx="2160000" cy="473760"/>
+            <a:ext cx="2159640" cy="473400"/>
           </a:xfrm>
           <a:prstGeom prst="rect">
             <a:avLst/>
@@ -1896,14 +1786,14 @@
       </p:sp>
       <p:sp>
         <p:nvSpPr>
-          <p:cNvPr id="43" name="Rectangle 5_1"/>
+          <p:cNvPr id="40" name="Rectangle 5_1"/>
           <p:cNvSpPr/>
           <p:nvPr/>
         </p:nvSpPr>
         <p:spPr>
           <a:xfrm>
             <a:off x="1980000" y="2269440"/>
-            <a:ext cx="2160000" cy="473760"/>
+            <a:ext cx="2159640" cy="473400"/>
           </a:xfrm>
           <a:prstGeom prst="rect">
             <a:avLst/>
@@ -1969,14 +1859,14 @@
       </p:sp>
       <p:sp>
         <p:nvSpPr>
-          <p:cNvPr id="44" name="Rectangle 6_1"/>
+          <p:cNvPr id="41" name="Rectangle 6_1"/>
           <p:cNvSpPr/>
           <p:nvPr/>
         </p:nvSpPr>
         <p:spPr>
           <a:xfrm>
             <a:off x="1980000" y="900000"/>
-            <a:ext cx="2160000" cy="473760"/>
+            <a:ext cx="2159640" cy="473400"/>
           </a:xfrm>
           <a:prstGeom prst="rect">
             <a:avLst/>
@@ -2042,14 +1932,14 @@
       </p:sp>
       <p:sp>
         <p:nvSpPr>
-          <p:cNvPr id="45" name="Rectangle 7_1"/>
+          <p:cNvPr id="42" name="Rectangle 7_1"/>
           <p:cNvSpPr/>
           <p:nvPr/>
         </p:nvSpPr>
         <p:spPr>
           <a:xfrm>
             <a:off x="1980000" y="1374840"/>
-            <a:ext cx="2160000" cy="473760"/>
+            <a:ext cx="2159640" cy="473400"/>
           </a:xfrm>
           <a:prstGeom prst="rect">
             <a:avLst/>
@@ -2115,14 +2005,14 @@
       </p:sp>
       <p:sp>
         <p:nvSpPr>
-          <p:cNvPr id="46" name="Text Box 11_1"/>
+          <p:cNvPr id="43" name="Text Box 11_1"/>
           <p:cNvSpPr/>
           <p:nvPr/>
         </p:nvSpPr>
         <p:spPr>
           <a:xfrm>
             <a:off x="4359600" y="900000"/>
-            <a:ext cx="5540400" cy="364320"/>
+            <a:ext cx="5540040" cy="363960"/>
           </a:xfrm>
           <a:prstGeom prst="rect">
             <a:avLst/>
@@ -2176,14 +2066,14 @@
       </p:sp>
       <p:sp>
         <p:nvSpPr>
-          <p:cNvPr id="47" name="Rectangle 4_0"/>
+          <p:cNvPr id="44" name="Rectangle 4_0"/>
           <p:cNvSpPr/>
           <p:nvPr/>
         </p:nvSpPr>
         <p:spPr>
           <a:xfrm>
             <a:off x="1980000" y="4587120"/>
-            <a:ext cx="2160000" cy="473760"/>
+            <a:ext cx="2159640" cy="473400"/>
           </a:xfrm>
           <a:prstGeom prst="rect">
             <a:avLst/>
@@ -2249,14 +2139,14 @@
       </p:sp>
       <p:sp>
         <p:nvSpPr>
-          <p:cNvPr id="48" name="Rectangle 5_0"/>
+          <p:cNvPr id="45" name="Rectangle 5_0"/>
           <p:cNvSpPr/>
           <p:nvPr/>
         </p:nvSpPr>
         <p:spPr>
           <a:xfrm>
             <a:off x="1980000" y="4112640"/>
-            <a:ext cx="2160000" cy="473760"/>
+            <a:ext cx="2159640" cy="473400"/>
           </a:xfrm>
           <a:prstGeom prst="rect">
             <a:avLst/>
@@ -2322,14 +2212,14 @@
       </p:sp>
       <p:sp>
         <p:nvSpPr>
-          <p:cNvPr id="49" name="Rectangle 7_0"/>
+          <p:cNvPr id="46" name="Rectangle 7_0"/>
           <p:cNvSpPr/>
           <p:nvPr/>
         </p:nvSpPr>
         <p:spPr>
           <a:xfrm>
             <a:off x="1980000" y="3218040"/>
-            <a:ext cx="2160000" cy="473760"/>
+            <a:ext cx="2159640" cy="473400"/>
           </a:xfrm>
           <a:prstGeom prst="rect">
             <a:avLst/>
@@ -2395,14 +2285,14 @@
       </p:sp>
       <p:sp>
         <p:nvSpPr>
-          <p:cNvPr id="50" name="Rectangle 7_2"/>
+          <p:cNvPr id="47" name="Rectangle 7_2"/>
           <p:cNvSpPr/>
           <p:nvPr/>
         </p:nvSpPr>
         <p:spPr>
           <a:xfrm>
             <a:off x="1980000" y="3638880"/>
-            <a:ext cx="2160000" cy="473760"/>
+            <a:ext cx="2159640" cy="473400"/>
           </a:xfrm>
           <a:prstGeom prst="rect">
             <a:avLst/>
@@ -2468,14 +2358,14 @@
       </p:sp>
       <p:sp>
         <p:nvSpPr>
-          <p:cNvPr id="51" name="Text Box 11_0"/>
+          <p:cNvPr id="48" name="Text Box 11_0"/>
           <p:cNvSpPr/>
           <p:nvPr/>
         </p:nvSpPr>
         <p:spPr>
           <a:xfrm>
             <a:off x="4359600" y="1435680"/>
-            <a:ext cx="5540400" cy="364320"/>
+            <a:ext cx="5540040" cy="363960"/>
           </a:xfrm>
           <a:prstGeom prst="rect">
             <a:avLst/>
@@ -2519,14 +2409,14 @@
       </p:sp>
       <p:sp>
         <p:nvSpPr>
-          <p:cNvPr id="52" name="Text Box 11_2"/>
+          <p:cNvPr id="49" name="Text Box 11_2"/>
           <p:cNvSpPr/>
           <p:nvPr/>
         </p:nvSpPr>
         <p:spPr>
           <a:xfrm>
             <a:off x="4320000" y="4675680"/>
-            <a:ext cx="5540400" cy="364320"/>
+            <a:ext cx="5540040" cy="363960"/>
           </a:xfrm>
           <a:prstGeom prst="rect">
             <a:avLst/>
@@ -2580,14 +2470,14 @@
       </p:sp>
       <p:sp>
         <p:nvSpPr>
-          <p:cNvPr id="53" name="Rectangle 6_0"/>
+          <p:cNvPr id="50" name="Rectangle 6_0"/>
           <p:cNvSpPr/>
           <p:nvPr/>
         </p:nvSpPr>
         <p:spPr>
           <a:xfrm>
             <a:off x="1980000" y="426240"/>
-            <a:ext cx="2160000" cy="473760"/>
+            <a:ext cx="2159640" cy="473400"/>
           </a:xfrm>
           <a:prstGeom prst="rect">
             <a:avLst/>
@@ -2653,14 +2543,14 @@
       </p:sp>
       <p:sp>
         <p:nvSpPr>
-          <p:cNvPr id="54" name="Text Box 11_3"/>
+          <p:cNvPr id="51" name="Text Box 11_3"/>
           <p:cNvSpPr/>
           <p:nvPr/>
         </p:nvSpPr>
         <p:spPr>
           <a:xfrm>
             <a:off x="4359600" y="535680"/>
-            <a:ext cx="5540400" cy="364320"/>
+            <a:ext cx="5540040" cy="363960"/>
           </a:xfrm>
           <a:prstGeom prst="rect">
             <a:avLst/>
@@ -2725,6 +2615,1277 @@
                 <a:ea typeface="DejaVu Sans"/>
               </a:rPr>
               <a:t>时的栈顶   </a:t>
+            </a:r>
+            <a:endParaRPr b="0" lang="en-US" sz="1800" spc="-1" strike="noStrike">
+              <a:latin typeface="Arial"/>
+            </a:endParaRPr>
+          </a:p>
+        </p:txBody>
+      </p:sp>
+    </p:spTree>
+  </p:cSld>
+  <mc:AlternateContent>
+    <mc:Choice Requires="p14">
+      <p:transition spd="slow" p14:dur="2000"/>
+    </mc:Choice>
+    <mc:Fallback>
+      <p:transition spd="slow"/>
+    </mc:Fallback>
+  </mc:AlternateContent>
+</p:sld>
+</file>
+
+<file path=ppt/slides/slide2.xml><?xml version="1.0" encoding="utf-8"?>
+<p:sld xmlns:a="http://schemas.openxmlformats.org/drawingml/2006/main" xmlns:p="http://schemas.openxmlformats.org/presentationml/2006/main" xmlns:r="http://schemas.openxmlformats.org/officeDocument/2006/relationships" xmlns:p14="http://schemas.microsoft.com/office/powerpoint/2010/main" xmlns:p15="http://schemas.microsoft.com/office/powerpoint/2012/main" xmlns:mc="http://schemas.openxmlformats.org/markup-compatibility/2006">
+  <p:cSld>
+    <p:spTree>
+      <p:nvGrpSpPr>
+        <p:cNvPr id="1" name=""/>
+        <p:cNvGrpSpPr/>
+        <p:nvPr/>
+      </p:nvGrpSpPr>
+      <p:grpSpPr>
+        <a:xfrm>
+          <a:off x="0" y="0"/>
+          <a:ext cx="0" cy="0"/>
+          <a:chOff x="0" y="0"/>
+          <a:chExt cx="0" cy="0"/>
+        </a:xfrm>
+      </p:grpSpPr>
+      <p:sp>
+        <p:nvSpPr>
+          <p:cNvPr id="52" name="Rectangle 3_0"/>
+          <p:cNvSpPr/>
+          <p:nvPr/>
+        </p:nvSpPr>
+        <p:spPr>
+          <a:xfrm>
+            <a:off x="1620360" y="2343600"/>
+            <a:ext cx="2159640" cy="450720"/>
+          </a:xfrm>
+          <a:prstGeom prst="rect">
+            <a:avLst/>
+          </a:prstGeom>
+          <a:solidFill>
+            <a:schemeClr val="bg1"/>
+          </a:solidFill>
+          <a:ln>
+            <a:solidFill>
+              <a:srgbClr val="000000"/>
+            </a:solidFill>
+          </a:ln>
+        </p:spPr>
+        <p:style>
+          <a:lnRef idx="2">
+            <a:schemeClr val="accent1">
+              <a:shade val="50000"/>
+            </a:schemeClr>
+          </a:lnRef>
+          <a:fillRef idx="1">
+            <a:schemeClr val="accent1"/>
+          </a:fillRef>
+          <a:effectRef idx="0">
+            <a:schemeClr val="accent1"/>
+          </a:effectRef>
+          <a:fontRef idx="minor"/>
+        </p:style>
+        <p:txBody>
+          <a:bodyPr lIns="90000" rIns="90000" tIns="45000" bIns="45000" anchor="ctr">
+            <a:noAutofit/>
+          </a:bodyPr>
+          <a:p>
+            <a:pPr algn="ctr">
+              <a:lnSpc>
+                <a:spcPct val="100000"/>
+              </a:lnSpc>
+            </a:pPr>
+            <a:r>
+              <a:rPr b="1" lang="en-US" sz="1800" spc="-1" strike="noStrike">
+                <a:solidFill>
+                  <a:srgbClr val="4472c4"/>
+                </a:solidFill>
+                <a:latin typeface="Arial"/>
+                <a:ea typeface="DejaVu Sans"/>
+              </a:rPr>
+              <a:t> </a:t>
+            </a:r>
+            <a:r>
+              <a:rPr b="1" lang="en-US" sz="1800" spc="-1" strike="noStrike">
+                <a:solidFill>
+                  <a:srgbClr val="4472c4"/>
+                </a:solidFill>
+                <a:latin typeface="Arial"/>
+                <a:ea typeface="DejaVu Sans"/>
+              </a:rPr>
+              <a:t>00 00 00 00</a:t>
+            </a:r>
+            <a:endParaRPr b="0" lang="en-US" sz="1800" spc="-1" strike="noStrike">
+              <a:latin typeface="Arial"/>
+            </a:endParaRPr>
+          </a:p>
+        </p:txBody>
+      </p:sp>
+      <p:sp>
+        <p:nvSpPr>
+          <p:cNvPr id="53" name="Rectangle 4_4"/>
+          <p:cNvSpPr/>
+          <p:nvPr/>
+        </p:nvSpPr>
+        <p:spPr>
+          <a:xfrm>
+            <a:off x="1620360" y="3195720"/>
+            <a:ext cx="2159640" cy="450360"/>
+          </a:xfrm>
+          <a:prstGeom prst="rect">
+            <a:avLst/>
+          </a:prstGeom>
+          <a:solidFill>
+            <a:schemeClr val="bg1"/>
+          </a:solidFill>
+          <a:ln>
+            <a:solidFill>
+              <a:srgbClr val="000000"/>
+            </a:solidFill>
+          </a:ln>
+        </p:spPr>
+        <p:style>
+          <a:lnRef idx="2">
+            <a:schemeClr val="accent1">
+              <a:shade val="50000"/>
+            </a:schemeClr>
+          </a:lnRef>
+          <a:fillRef idx="1">
+            <a:schemeClr val="accent1"/>
+          </a:fillRef>
+          <a:effectRef idx="0">
+            <a:schemeClr val="accent1"/>
+          </a:effectRef>
+          <a:fontRef idx="minor"/>
+        </p:style>
+        <p:txBody>
+          <a:bodyPr lIns="90000" rIns="90000" tIns="45000" bIns="45000" anchor="ctr">
+            <a:noAutofit/>
+          </a:bodyPr>
+          <a:p>
+            <a:pPr algn="ctr">
+              <a:lnSpc>
+                <a:spcPct val="100000"/>
+              </a:lnSpc>
+            </a:pPr>
+            <a:r>
+              <a:rPr b="1" lang="en-US" sz="1800" spc="-1" strike="noStrike">
+                <a:solidFill>
+                  <a:srgbClr val="4472c4"/>
+                </a:solidFill>
+                <a:latin typeface="Arial"/>
+                <a:ea typeface="DejaVu Sans"/>
+              </a:rPr>
+              <a:t> </a:t>
+            </a:r>
+            <a:r>
+              <a:rPr b="1" lang="en-US" sz="1800" spc="-1" strike="noStrike">
+                <a:solidFill>
+                  <a:srgbClr val="4472c4"/>
+                </a:solidFill>
+                <a:latin typeface="Arial"/>
+                <a:ea typeface="DejaVu Sans"/>
+              </a:rPr>
+              <a:t>00 00 00 00</a:t>
+            </a:r>
+            <a:endParaRPr b="0" lang="en-US" sz="1800" spc="-1" strike="noStrike">
+              <a:latin typeface="Arial"/>
+            </a:endParaRPr>
+          </a:p>
+        </p:txBody>
+      </p:sp>
+      <p:sp>
+        <p:nvSpPr>
+          <p:cNvPr id="54" name="Rectangle 5_4"/>
+          <p:cNvSpPr/>
+          <p:nvPr/>
+        </p:nvSpPr>
+        <p:spPr>
+          <a:xfrm>
+            <a:off x="1620360" y="2744280"/>
+            <a:ext cx="2159640" cy="450360"/>
+          </a:xfrm>
+          <a:prstGeom prst="rect">
+            <a:avLst/>
+          </a:prstGeom>
+          <a:solidFill>
+            <a:schemeClr val="bg1"/>
+          </a:solidFill>
+          <a:ln>
+            <a:solidFill>
+              <a:srgbClr val="000000"/>
+            </a:solidFill>
+          </a:ln>
+        </p:spPr>
+        <p:style>
+          <a:lnRef idx="2">
+            <a:schemeClr val="accent1">
+              <a:shade val="50000"/>
+            </a:schemeClr>
+          </a:lnRef>
+          <a:fillRef idx="1">
+            <a:schemeClr val="accent1"/>
+          </a:fillRef>
+          <a:effectRef idx="0">
+            <a:schemeClr val="accent1"/>
+          </a:effectRef>
+          <a:fontRef idx="minor"/>
+        </p:style>
+        <p:txBody>
+          <a:bodyPr lIns="90000" rIns="90000" tIns="45000" bIns="45000" anchor="ctr">
+            <a:noAutofit/>
+          </a:bodyPr>
+          <a:p>
+            <a:pPr algn="ctr">
+              <a:lnSpc>
+                <a:spcPct val="100000"/>
+              </a:lnSpc>
+            </a:pPr>
+            <a:r>
+              <a:rPr b="1" lang="en-US" sz="1800" spc="-1" strike="noStrike">
+                <a:solidFill>
+                  <a:srgbClr val="4472c4"/>
+                </a:solidFill>
+                <a:latin typeface="Arial"/>
+                <a:ea typeface="DejaVu Sans"/>
+              </a:rPr>
+              <a:t> </a:t>
+            </a:r>
+            <a:r>
+              <a:rPr b="1" lang="en-US" sz="1800" spc="-1" strike="noStrike">
+                <a:solidFill>
+                  <a:srgbClr val="4472c4"/>
+                </a:solidFill>
+                <a:latin typeface="Arial"/>
+                <a:ea typeface="DejaVu Sans"/>
+              </a:rPr>
+              <a:t>00 00 00 00</a:t>
+            </a:r>
+            <a:endParaRPr b="0" lang="en-US" sz="1800" spc="-1" strike="noStrike">
+              <a:latin typeface="Arial"/>
+            </a:endParaRPr>
+          </a:p>
+        </p:txBody>
+      </p:sp>
+      <p:sp>
+        <p:nvSpPr>
+          <p:cNvPr id="55" name="Rectangle 6_4"/>
+          <p:cNvSpPr/>
+          <p:nvPr/>
+        </p:nvSpPr>
+        <p:spPr>
+          <a:xfrm>
+            <a:off x="1620360" y="1441080"/>
+            <a:ext cx="2159640" cy="450360"/>
+          </a:xfrm>
+          <a:prstGeom prst="rect">
+            <a:avLst/>
+          </a:prstGeom>
+          <a:solidFill>
+            <a:schemeClr val="bg1"/>
+          </a:solidFill>
+          <a:ln>
+            <a:solidFill>
+              <a:srgbClr val="000000"/>
+            </a:solidFill>
+          </a:ln>
+        </p:spPr>
+        <p:style>
+          <a:lnRef idx="2">
+            <a:schemeClr val="accent1">
+              <a:shade val="50000"/>
+            </a:schemeClr>
+          </a:lnRef>
+          <a:fillRef idx="1">
+            <a:schemeClr val="accent1"/>
+          </a:fillRef>
+          <a:effectRef idx="0">
+            <a:schemeClr val="accent1"/>
+          </a:effectRef>
+          <a:fontRef idx="minor"/>
+        </p:style>
+        <p:txBody>
+          <a:bodyPr lIns="90000" rIns="90000" tIns="45000" bIns="45000" anchor="ctr">
+            <a:noAutofit/>
+          </a:bodyPr>
+          <a:p>
+            <a:pPr algn="ctr">
+              <a:lnSpc>
+                <a:spcPct val="100000"/>
+              </a:lnSpc>
+            </a:pPr>
+            <a:r>
+              <a:rPr b="1" lang="en-US" sz="1800" spc="-1" strike="noStrike">
+                <a:solidFill>
+                  <a:srgbClr val="4472c4"/>
+                </a:solidFill>
+                <a:latin typeface="Arial"/>
+                <a:ea typeface="DejaVu Sans"/>
+              </a:rPr>
+              <a:t>  </a:t>
+            </a:r>
+            <a:r>
+              <a:rPr b="1" lang="en-US" sz="1800" spc="-1" strike="noStrike">
+                <a:solidFill>
+                  <a:srgbClr val="4472c4"/>
+                </a:solidFill>
+                <a:latin typeface="Arial"/>
+                <a:ea typeface="DejaVu Sans"/>
+              </a:rPr>
+              <a:t>00 00 00 00 </a:t>
+            </a:r>
+            <a:endParaRPr b="0" lang="en-US" sz="1800" spc="-1" strike="noStrike">
+              <a:latin typeface="Arial"/>
+            </a:endParaRPr>
+          </a:p>
+        </p:txBody>
+      </p:sp>
+      <p:sp>
+        <p:nvSpPr>
+          <p:cNvPr id="56" name="Rectangle 7_6"/>
+          <p:cNvSpPr/>
+          <p:nvPr/>
+        </p:nvSpPr>
+        <p:spPr>
+          <a:xfrm>
+            <a:off x="1620360" y="1892880"/>
+            <a:ext cx="2159640" cy="450360"/>
+          </a:xfrm>
+          <a:prstGeom prst="rect">
+            <a:avLst/>
+          </a:prstGeom>
+          <a:solidFill>
+            <a:schemeClr val="bg1"/>
+          </a:solidFill>
+          <a:ln>
+            <a:solidFill>
+              <a:srgbClr val="000000"/>
+            </a:solidFill>
+          </a:ln>
+        </p:spPr>
+        <p:style>
+          <a:lnRef idx="2">
+            <a:schemeClr val="accent1">
+              <a:shade val="50000"/>
+            </a:schemeClr>
+          </a:lnRef>
+          <a:fillRef idx="1">
+            <a:schemeClr val="accent1"/>
+          </a:fillRef>
+          <a:effectRef idx="0">
+            <a:schemeClr val="accent1"/>
+          </a:effectRef>
+          <a:fontRef idx="minor"/>
+        </p:style>
+        <p:txBody>
+          <a:bodyPr lIns="90000" rIns="90000" tIns="45000" bIns="45000" anchor="ctr">
+            <a:noAutofit/>
+          </a:bodyPr>
+          <a:p>
+            <a:pPr algn="ctr">
+              <a:lnSpc>
+                <a:spcPct val="100000"/>
+              </a:lnSpc>
+            </a:pPr>
+            <a:r>
+              <a:rPr b="1" lang="en-US" sz="1800" spc="-1" strike="noStrike">
+                <a:solidFill>
+                  <a:srgbClr val="4472c4"/>
+                </a:solidFill>
+                <a:latin typeface="Arial"/>
+                <a:ea typeface="DejaVu Sans"/>
+              </a:rPr>
+              <a:t> </a:t>
+            </a:r>
+            <a:r>
+              <a:rPr b="1" lang="en-US" sz="1800" spc="-1" strike="noStrike">
+                <a:solidFill>
+                  <a:srgbClr val="4472c4"/>
+                </a:solidFill>
+                <a:latin typeface="Arial"/>
+                <a:ea typeface="DejaVu Sans"/>
+              </a:rPr>
+              <a:t>00 00 00 00</a:t>
+            </a:r>
+            <a:endParaRPr b="0" lang="en-US" sz="1800" spc="-1" strike="noStrike">
+              <a:latin typeface="Arial"/>
+            </a:endParaRPr>
+          </a:p>
+        </p:txBody>
+      </p:sp>
+      <p:sp>
+        <p:nvSpPr>
+          <p:cNvPr id="57" name="Text Box 11_8"/>
+          <p:cNvSpPr/>
+          <p:nvPr/>
+        </p:nvSpPr>
+        <p:spPr>
+          <a:xfrm>
+            <a:off x="3999960" y="1441080"/>
+            <a:ext cx="5540040" cy="363960"/>
+          </a:xfrm>
+          <a:prstGeom prst="rect">
+            <a:avLst/>
+          </a:prstGeom>
+          <a:noFill/>
+          <a:ln w="0">
+            <a:noFill/>
+          </a:ln>
+        </p:spPr>
+        <p:style>
+          <a:lnRef idx="0"/>
+          <a:fillRef idx="0"/>
+          <a:effectRef idx="0"/>
+          <a:fontRef idx="minor"/>
+        </p:style>
+        <p:txBody>
+          <a:bodyPr lIns="90000" rIns="90000" tIns="45000" bIns="45000">
+            <a:spAutoFit/>
+          </a:bodyPr>
+          <a:p>
+            <a:pPr>
+              <a:lnSpc>
+                <a:spcPct val="100000"/>
+              </a:lnSpc>
+            </a:pPr>
+            <a:r>
+              <a:rPr b="0" lang="en-US" sz="1800" spc="-1" strike="noStrike">
+                <a:solidFill>
+                  <a:srgbClr val="000000"/>
+                </a:solidFill>
+                <a:latin typeface="Arial"/>
+                <a:ea typeface="DejaVu Sans"/>
+              </a:rPr>
+              <a:t>0x556835b0 getbuf</a:t>
+            </a:r>
+            <a:r>
+              <a:rPr b="0" lang="zh-CN" sz="1800" spc="-1" strike="noStrike">
+                <a:solidFill>
+                  <a:srgbClr val="000000"/>
+                </a:solidFill>
+                <a:latin typeface="Arial"/>
+                <a:ea typeface="DejaVu Sans"/>
+              </a:rPr>
+              <a:t>开始为字符串准备内存时栈顶   </a:t>
+            </a:r>
+            <a:endParaRPr b="0" lang="en-US" sz="1800" spc="-1" strike="noStrike">
+              <a:latin typeface="Arial"/>
+            </a:endParaRPr>
+          </a:p>
+        </p:txBody>
+      </p:sp>
+      <p:sp>
+        <p:nvSpPr>
+          <p:cNvPr id="58" name="Rectangle 4_5"/>
+          <p:cNvSpPr/>
+          <p:nvPr/>
+        </p:nvSpPr>
+        <p:spPr>
+          <a:xfrm>
+            <a:off x="1620360" y="4949640"/>
+            <a:ext cx="2159640" cy="450360"/>
+          </a:xfrm>
+          <a:prstGeom prst="rect">
+            <a:avLst/>
+          </a:prstGeom>
+          <a:solidFill>
+            <a:schemeClr val="bg1"/>
+          </a:solidFill>
+          <a:ln>
+            <a:solidFill>
+              <a:srgbClr val="000000"/>
+            </a:solidFill>
+          </a:ln>
+        </p:spPr>
+        <p:style>
+          <a:lnRef idx="2">
+            <a:schemeClr val="accent1">
+              <a:shade val="50000"/>
+            </a:schemeClr>
+          </a:lnRef>
+          <a:fillRef idx="1">
+            <a:schemeClr val="accent1"/>
+          </a:fillRef>
+          <a:effectRef idx="0">
+            <a:schemeClr val="accent1"/>
+          </a:effectRef>
+          <a:fontRef idx="minor"/>
+        </p:style>
+        <p:txBody>
+          <a:bodyPr lIns="90000" rIns="90000" tIns="45000" bIns="45000" anchor="ctr">
+            <a:noAutofit/>
+          </a:bodyPr>
+          <a:p>
+            <a:pPr algn="ctr">
+              <a:lnSpc>
+                <a:spcPct val="100000"/>
+              </a:lnSpc>
+            </a:pPr>
+            <a:r>
+              <a:rPr b="1" lang="en-US" sz="1800" spc="-1" strike="noStrike">
+                <a:solidFill>
+                  <a:srgbClr val="4472c4"/>
+                </a:solidFill>
+                <a:latin typeface="Arial"/>
+                <a:ea typeface="DejaVu Sans"/>
+              </a:rPr>
+              <a:t> </a:t>
+            </a:r>
+            <a:r>
+              <a:rPr b="1" lang="en-US" sz="1800" spc="-1" strike="noStrike">
+                <a:solidFill>
+                  <a:srgbClr val="4472c4"/>
+                </a:solidFill>
+                <a:latin typeface="Arial"/>
+                <a:ea typeface="DejaVu Sans"/>
+              </a:rPr>
+              <a:t>00 00 00 00</a:t>
+            </a:r>
+            <a:endParaRPr b="0" lang="en-US" sz="1800" spc="-1" strike="noStrike">
+              <a:latin typeface="Arial"/>
+            </a:endParaRPr>
+          </a:p>
+        </p:txBody>
+      </p:sp>
+      <p:sp>
+        <p:nvSpPr>
+          <p:cNvPr id="59" name="Rectangle 5_5"/>
+          <p:cNvSpPr/>
+          <p:nvPr/>
+        </p:nvSpPr>
+        <p:spPr>
+          <a:xfrm>
+            <a:off x="1620360" y="4498200"/>
+            <a:ext cx="2159640" cy="450360"/>
+          </a:xfrm>
+          <a:prstGeom prst="rect">
+            <a:avLst/>
+          </a:prstGeom>
+          <a:solidFill>
+            <a:schemeClr val="bg1"/>
+          </a:solidFill>
+          <a:ln>
+            <a:solidFill>
+              <a:srgbClr val="000000"/>
+            </a:solidFill>
+          </a:ln>
+        </p:spPr>
+        <p:style>
+          <a:lnRef idx="2">
+            <a:schemeClr val="accent1">
+              <a:shade val="50000"/>
+            </a:schemeClr>
+          </a:lnRef>
+          <a:fillRef idx="1">
+            <a:schemeClr val="accent1"/>
+          </a:fillRef>
+          <a:effectRef idx="0">
+            <a:schemeClr val="accent1"/>
+          </a:effectRef>
+          <a:fontRef idx="minor"/>
+        </p:style>
+        <p:txBody>
+          <a:bodyPr lIns="90000" rIns="90000" tIns="45000" bIns="45000" anchor="ctr">
+            <a:noAutofit/>
+          </a:bodyPr>
+          <a:p>
+            <a:pPr algn="ctr">
+              <a:lnSpc>
+                <a:spcPct val="100000"/>
+              </a:lnSpc>
+            </a:pPr>
+            <a:r>
+              <a:rPr b="1" lang="en-US" sz="1800" spc="-1" strike="noStrike">
+                <a:solidFill>
+                  <a:srgbClr val="4472c4"/>
+                </a:solidFill>
+                <a:latin typeface="Arial"/>
+                <a:ea typeface="DejaVu Sans"/>
+              </a:rPr>
+              <a:t> </a:t>
+            </a:r>
+            <a:r>
+              <a:rPr b="1" lang="en-US" sz="1800" spc="-1" strike="noStrike">
+                <a:solidFill>
+                  <a:srgbClr val="4472c4"/>
+                </a:solidFill>
+                <a:latin typeface="Arial"/>
+                <a:ea typeface="DejaVu Sans"/>
+              </a:rPr>
+              <a:t>00 00 00 00</a:t>
+            </a:r>
+            <a:endParaRPr b="0" lang="en-US" sz="1800" spc="-1" strike="noStrike">
+              <a:latin typeface="Arial"/>
+            </a:endParaRPr>
+          </a:p>
+        </p:txBody>
+      </p:sp>
+      <p:sp>
+        <p:nvSpPr>
+          <p:cNvPr id="60" name="Rectangle 7_7"/>
+          <p:cNvSpPr/>
+          <p:nvPr/>
+        </p:nvSpPr>
+        <p:spPr>
+          <a:xfrm>
+            <a:off x="1620360" y="3646800"/>
+            <a:ext cx="2159640" cy="450360"/>
+          </a:xfrm>
+          <a:prstGeom prst="rect">
+            <a:avLst/>
+          </a:prstGeom>
+          <a:solidFill>
+            <a:schemeClr val="bg1"/>
+          </a:solidFill>
+          <a:ln>
+            <a:solidFill>
+              <a:srgbClr val="000000"/>
+            </a:solidFill>
+          </a:ln>
+        </p:spPr>
+        <p:style>
+          <a:lnRef idx="2">
+            <a:schemeClr val="accent1">
+              <a:shade val="50000"/>
+            </a:schemeClr>
+          </a:lnRef>
+          <a:fillRef idx="1">
+            <a:schemeClr val="accent1"/>
+          </a:fillRef>
+          <a:effectRef idx="0">
+            <a:schemeClr val="accent1"/>
+          </a:effectRef>
+          <a:fontRef idx="minor"/>
+        </p:style>
+        <p:txBody>
+          <a:bodyPr lIns="90000" rIns="90000" tIns="45000" bIns="45000" anchor="ctr">
+            <a:noAutofit/>
+          </a:bodyPr>
+          <a:p>
+            <a:pPr algn="ctr">
+              <a:lnSpc>
+                <a:spcPct val="100000"/>
+              </a:lnSpc>
+            </a:pPr>
+            <a:r>
+              <a:rPr b="1" lang="en-US" sz="1800" spc="-1" strike="noStrike">
+                <a:solidFill>
+                  <a:srgbClr val="4472c4"/>
+                </a:solidFill>
+                <a:latin typeface="Arial"/>
+                <a:ea typeface="DejaVu Sans"/>
+              </a:rPr>
+              <a:t> </a:t>
+            </a:r>
+            <a:r>
+              <a:rPr b="1" lang="en-US" sz="1800" spc="-1" strike="noStrike">
+                <a:solidFill>
+                  <a:srgbClr val="4472c4"/>
+                </a:solidFill>
+                <a:latin typeface="Arial"/>
+                <a:ea typeface="DejaVu Sans"/>
+              </a:rPr>
+              <a:t>00 00 00 00</a:t>
+            </a:r>
+            <a:endParaRPr b="0" lang="en-US" sz="1800" spc="-1" strike="noStrike">
+              <a:latin typeface="Arial"/>
+            </a:endParaRPr>
+          </a:p>
+        </p:txBody>
+      </p:sp>
+      <p:sp>
+        <p:nvSpPr>
+          <p:cNvPr id="61" name="Rectangle 7_8"/>
+          <p:cNvSpPr/>
+          <p:nvPr/>
+        </p:nvSpPr>
+        <p:spPr>
+          <a:xfrm>
+            <a:off x="1620360" y="4047120"/>
+            <a:ext cx="2159640" cy="450720"/>
+          </a:xfrm>
+          <a:prstGeom prst="rect">
+            <a:avLst/>
+          </a:prstGeom>
+          <a:solidFill>
+            <a:schemeClr val="bg1"/>
+          </a:solidFill>
+          <a:ln>
+            <a:solidFill>
+              <a:srgbClr val="000000"/>
+            </a:solidFill>
+          </a:ln>
+        </p:spPr>
+        <p:style>
+          <a:lnRef idx="2">
+            <a:schemeClr val="accent1">
+              <a:shade val="50000"/>
+            </a:schemeClr>
+          </a:lnRef>
+          <a:fillRef idx="1">
+            <a:schemeClr val="accent1"/>
+          </a:fillRef>
+          <a:effectRef idx="0">
+            <a:schemeClr val="accent1"/>
+          </a:effectRef>
+          <a:fontRef idx="minor"/>
+        </p:style>
+        <p:txBody>
+          <a:bodyPr lIns="90000" rIns="90000" tIns="45000" bIns="45000" anchor="ctr">
+            <a:noAutofit/>
+          </a:bodyPr>
+          <a:p>
+            <a:pPr algn="ctr">
+              <a:lnSpc>
+                <a:spcPct val="100000"/>
+              </a:lnSpc>
+            </a:pPr>
+            <a:r>
+              <a:rPr b="1" lang="en-US" sz="1800" spc="-1" strike="noStrike">
+                <a:solidFill>
+                  <a:srgbClr val="4472c4"/>
+                </a:solidFill>
+                <a:latin typeface="Arial"/>
+                <a:ea typeface="DejaVu Sans"/>
+              </a:rPr>
+              <a:t> </a:t>
+            </a:r>
+            <a:r>
+              <a:rPr b="1" lang="en-US" sz="1800" spc="-1" strike="noStrike">
+                <a:solidFill>
+                  <a:srgbClr val="4472c4"/>
+                </a:solidFill>
+                <a:latin typeface="Arial"/>
+                <a:ea typeface="DejaVu Sans"/>
+              </a:rPr>
+              <a:t>00 00 00 00</a:t>
+            </a:r>
+            <a:endParaRPr b="0" lang="en-US" sz="1800" spc="-1" strike="noStrike">
+              <a:latin typeface="Arial"/>
+            </a:endParaRPr>
+          </a:p>
+        </p:txBody>
+      </p:sp>
+      <p:sp>
+        <p:nvSpPr>
+          <p:cNvPr id="62" name="Text Box 11_9"/>
+          <p:cNvSpPr/>
+          <p:nvPr/>
+        </p:nvSpPr>
+        <p:spPr>
+          <a:xfrm>
+            <a:off x="3999960" y="1950840"/>
+            <a:ext cx="5540040" cy="363960"/>
+          </a:xfrm>
+          <a:prstGeom prst="rect">
+            <a:avLst/>
+          </a:prstGeom>
+          <a:noFill/>
+          <a:ln w="0">
+            <a:noFill/>
+          </a:ln>
+        </p:spPr>
+        <p:style>
+          <a:lnRef idx="0"/>
+          <a:fillRef idx="0"/>
+          <a:effectRef idx="0"/>
+          <a:fontRef idx="minor"/>
+        </p:style>
+        <p:txBody>
+          <a:bodyPr lIns="90000" rIns="90000" tIns="45000" bIns="45000">
+            <a:spAutoFit/>
+          </a:bodyPr>
+          <a:p>
+            <a:pPr>
+              <a:lnSpc>
+                <a:spcPct val="100000"/>
+              </a:lnSpc>
+            </a:pPr>
+            <a:r>
+              <a:rPr b="0" lang="en-US" sz="1800" spc="-1" strike="noStrike">
+                <a:solidFill>
+                  <a:srgbClr val="000000"/>
+                </a:solidFill>
+                <a:latin typeface="Arial"/>
+                <a:ea typeface="DejaVu Sans"/>
+              </a:rPr>
+              <a:t>0x556835b0-4 </a:t>
+            </a:r>
+            <a:endParaRPr b="0" lang="en-US" sz="1800" spc="-1" strike="noStrike">
+              <a:latin typeface="Arial"/>
+            </a:endParaRPr>
+          </a:p>
+        </p:txBody>
+      </p:sp>
+      <p:sp>
+        <p:nvSpPr>
+          <p:cNvPr id="63" name="Text Box 11_10"/>
+          <p:cNvSpPr/>
+          <p:nvPr/>
+        </p:nvSpPr>
+        <p:spPr>
+          <a:xfrm>
+            <a:off x="3960360" y="5033880"/>
+            <a:ext cx="5540040" cy="363960"/>
+          </a:xfrm>
+          <a:prstGeom prst="rect">
+            <a:avLst/>
+          </a:prstGeom>
+          <a:noFill/>
+          <a:ln w="0">
+            <a:noFill/>
+          </a:ln>
+        </p:spPr>
+        <p:style>
+          <a:lnRef idx="0"/>
+          <a:fillRef idx="0"/>
+          <a:effectRef idx="0"/>
+          <a:fontRef idx="minor"/>
+        </p:style>
+        <p:txBody>
+          <a:bodyPr lIns="90000" rIns="90000" tIns="45000" bIns="45000">
+            <a:spAutoFit/>
+          </a:bodyPr>
+          <a:p>
+            <a:pPr>
+              <a:lnSpc>
+                <a:spcPct val="100000"/>
+              </a:lnSpc>
+            </a:pPr>
+            <a:r>
+              <a:rPr b="0" lang="en-US" sz="1800" spc="-1" strike="noStrike">
+                <a:solidFill>
+                  <a:srgbClr val="000000"/>
+                </a:solidFill>
+                <a:latin typeface="Arial"/>
+                <a:ea typeface="DejaVu Sans"/>
+              </a:rPr>
+              <a:t>0x556835b0-32 </a:t>
+            </a:r>
+            <a:r>
+              <a:rPr b="0" lang="zh-CN" sz="1800" spc="-1" strike="noStrike">
+                <a:solidFill>
+                  <a:srgbClr val="000000"/>
+                </a:solidFill>
+                <a:latin typeface="Arial"/>
+                <a:ea typeface="DejaVu Sans"/>
+              </a:rPr>
+              <a:t>字符串开始输入位置   </a:t>
+            </a:r>
+            <a:endParaRPr b="0" lang="en-US" sz="1800" spc="-1" strike="noStrike">
+              <a:latin typeface="Arial"/>
+            </a:endParaRPr>
+          </a:p>
+        </p:txBody>
+      </p:sp>
+      <p:sp>
+        <p:nvSpPr>
+          <p:cNvPr id="64" name="Rectangle 6_5"/>
+          <p:cNvSpPr/>
+          <p:nvPr/>
+        </p:nvSpPr>
+        <p:spPr>
+          <a:xfrm>
+            <a:off x="1620360" y="990360"/>
+            <a:ext cx="2159640" cy="450360"/>
+          </a:xfrm>
+          <a:prstGeom prst="rect">
+            <a:avLst/>
+          </a:prstGeom>
+          <a:solidFill>
+            <a:schemeClr val="bg1"/>
+          </a:solidFill>
+          <a:ln>
+            <a:solidFill>
+              <a:srgbClr val="000000"/>
+            </a:solidFill>
+          </a:ln>
+        </p:spPr>
+        <p:style>
+          <a:lnRef idx="2">
+            <a:schemeClr val="accent1">
+              <a:shade val="50000"/>
+            </a:schemeClr>
+          </a:lnRef>
+          <a:fillRef idx="1">
+            <a:schemeClr val="accent1"/>
+          </a:fillRef>
+          <a:effectRef idx="0">
+            <a:schemeClr val="accent1"/>
+          </a:effectRef>
+          <a:fontRef idx="minor"/>
+        </p:style>
+        <p:txBody>
+          <a:bodyPr lIns="90000" rIns="90000" tIns="45000" bIns="45000" anchor="ctr">
+            <a:noAutofit/>
+          </a:bodyPr>
+          <a:p>
+            <a:pPr algn="ctr">
+              <a:lnSpc>
+                <a:spcPct val="100000"/>
+              </a:lnSpc>
+            </a:pPr>
+            <a:r>
+              <a:rPr b="1" lang="en-US" sz="1800" spc="-1" strike="noStrike">
+                <a:solidFill>
+                  <a:srgbClr val="4472c4"/>
+                </a:solidFill>
+                <a:latin typeface="Arial"/>
+                <a:ea typeface="DejaVu Sans"/>
+              </a:rPr>
+              <a:t>  </a:t>
+            </a:r>
+            <a:r>
+              <a:rPr b="1" lang="en-US" sz="1800" spc="-1" strike="noStrike">
+                <a:solidFill>
+                  <a:srgbClr val="4472c4"/>
+                </a:solidFill>
+                <a:latin typeface="Arial"/>
+                <a:ea typeface="DejaVu Sans"/>
+              </a:rPr>
+              <a:t>08 04 8c 42 </a:t>
+            </a:r>
+            <a:endParaRPr b="0" lang="en-US" sz="1800" spc="-1" strike="noStrike">
+              <a:latin typeface="Arial"/>
+            </a:endParaRPr>
+          </a:p>
+        </p:txBody>
+      </p:sp>
+      <p:sp>
+        <p:nvSpPr>
+          <p:cNvPr id="65" name="Text Box 11_11"/>
+          <p:cNvSpPr/>
+          <p:nvPr/>
+        </p:nvSpPr>
+        <p:spPr>
+          <a:xfrm>
+            <a:off x="3999960" y="1094400"/>
+            <a:ext cx="5540040" cy="638280"/>
+          </a:xfrm>
+          <a:prstGeom prst="rect">
+            <a:avLst/>
+          </a:prstGeom>
+          <a:noFill/>
+          <a:ln w="0">
+            <a:noFill/>
+          </a:ln>
+        </p:spPr>
+        <p:style>
+          <a:lnRef idx="0"/>
+          <a:fillRef idx="0"/>
+          <a:effectRef idx="0"/>
+          <a:fontRef idx="minor"/>
+        </p:style>
+        <p:txBody>
+          <a:bodyPr lIns="90000" rIns="90000" tIns="45000" bIns="45000">
+            <a:spAutoFit/>
+          </a:bodyPr>
+          <a:p>
+            <a:pPr>
+              <a:lnSpc>
+                <a:spcPct val="100000"/>
+              </a:lnSpc>
+            </a:pPr>
+            <a:r>
+              <a:rPr b="0" lang="en-US" sz="1800" spc="-1" strike="noStrike">
+                <a:solidFill>
+                  <a:srgbClr val="000000"/>
+                </a:solidFill>
+                <a:latin typeface="Arial"/>
+                <a:ea typeface="DejaVu Sans"/>
+              </a:rPr>
+              <a:t>0x556835b4 getbuf</a:t>
+            </a:r>
+            <a:r>
+              <a:rPr b="0" lang="zh-CN" sz="1800" spc="-1" strike="noStrike">
+                <a:solidFill>
+                  <a:srgbClr val="000000"/>
+                </a:solidFill>
+                <a:latin typeface="Arial"/>
+                <a:ea typeface="DejaVu Sans"/>
+              </a:rPr>
+              <a:t>执行</a:t>
+            </a:r>
+            <a:r>
+              <a:rPr b="0" lang="en-US" sz="1800" spc="-1" strike="noStrike">
+                <a:solidFill>
+                  <a:srgbClr val="000000"/>
+                </a:solidFill>
+                <a:latin typeface="Arial"/>
+                <a:ea typeface="DejaVu Sans"/>
+              </a:rPr>
+              <a:t>ret</a:t>
+            </a:r>
+            <a:r>
+              <a:rPr b="0" lang="zh-CN" sz="1800" spc="-1" strike="noStrike">
+                <a:solidFill>
+                  <a:srgbClr val="000000"/>
+                </a:solidFill>
+                <a:latin typeface="Arial"/>
+                <a:ea typeface="DejaVu Sans"/>
+              </a:rPr>
+              <a:t>时的栈顶，保存</a:t>
+            </a:r>
+            <a:r>
+              <a:rPr b="0" lang="en-US" sz="1800" spc="-1" strike="noStrike">
+                <a:solidFill>
+                  <a:srgbClr val="000000"/>
+                </a:solidFill>
+                <a:latin typeface="Arial"/>
+                <a:ea typeface="DejaVu Sans"/>
+              </a:rPr>
+              <a:t>fizz</a:t>
+            </a:r>
+            <a:r>
+              <a:rPr b="0" lang="zh-CN" sz="1800" spc="-1" strike="noStrike">
+                <a:solidFill>
+                  <a:srgbClr val="000000"/>
+                </a:solidFill>
+                <a:latin typeface="Arial"/>
+                <a:ea typeface="DejaVu Sans"/>
+              </a:rPr>
+              <a:t>地质   </a:t>
+            </a:r>
+            <a:endParaRPr b="0" lang="en-US" sz="1800" spc="-1" strike="noStrike">
+              <a:latin typeface="Arial"/>
+            </a:endParaRPr>
+          </a:p>
+        </p:txBody>
+      </p:sp>
+      <p:sp>
+        <p:nvSpPr>
+          <p:cNvPr id="66" name="Rectangle 6_2"/>
+          <p:cNvSpPr/>
+          <p:nvPr/>
+        </p:nvSpPr>
+        <p:spPr>
+          <a:xfrm>
+            <a:off x="1620360" y="539640"/>
+            <a:ext cx="2159640" cy="450720"/>
+          </a:xfrm>
+          <a:prstGeom prst="rect">
+            <a:avLst/>
+          </a:prstGeom>
+          <a:solidFill>
+            <a:schemeClr val="bg1"/>
+          </a:solidFill>
+          <a:ln>
+            <a:solidFill>
+              <a:srgbClr val="000000"/>
+            </a:solidFill>
+          </a:ln>
+        </p:spPr>
+        <p:style>
+          <a:lnRef idx="2">
+            <a:schemeClr val="accent1">
+              <a:shade val="50000"/>
+            </a:schemeClr>
+          </a:lnRef>
+          <a:fillRef idx="1">
+            <a:schemeClr val="accent1"/>
+          </a:fillRef>
+          <a:effectRef idx="0">
+            <a:schemeClr val="accent1"/>
+          </a:effectRef>
+          <a:fontRef idx="minor"/>
+        </p:style>
+        <p:txBody>
+          <a:bodyPr lIns="90000" rIns="90000" tIns="45000" bIns="45000" anchor="ctr">
+            <a:noAutofit/>
+          </a:bodyPr>
+          <a:p>
+            <a:pPr algn="ctr">
+              <a:lnSpc>
+                <a:spcPct val="100000"/>
+              </a:lnSpc>
+            </a:pPr>
+            <a:r>
+              <a:rPr b="1" lang="en-US" sz="1800" spc="-1" strike="noStrike">
+                <a:solidFill>
+                  <a:srgbClr val="4472c4"/>
+                </a:solidFill>
+                <a:latin typeface="Arial"/>
+                <a:ea typeface="DejaVu Sans"/>
+              </a:rPr>
+              <a:t>  </a:t>
+            </a:r>
+            <a:r>
+              <a:rPr b="1" lang="en-US" sz="1800" spc="-1" strike="noStrike">
+                <a:solidFill>
+                  <a:srgbClr val="4472c4"/>
+                </a:solidFill>
+                <a:latin typeface="Arial"/>
+                <a:ea typeface="DejaVu Sans"/>
+              </a:rPr>
+              <a:t>00 00 00 00 </a:t>
+            </a:r>
+            <a:endParaRPr b="0" lang="en-US" sz="1800" spc="-1" strike="noStrike">
+              <a:latin typeface="Arial"/>
+            </a:endParaRPr>
+          </a:p>
+        </p:txBody>
+      </p:sp>
+      <p:sp>
+        <p:nvSpPr>
+          <p:cNvPr id="67" name="Rectangle 6_3"/>
+          <p:cNvSpPr/>
+          <p:nvPr/>
+        </p:nvSpPr>
+        <p:spPr>
+          <a:xfrm>
+            <a:off x="1620360" y="89280"/>
+            <a:ext cx="2159640" cy="450360"/>
+          </a:xfrm>
+          <a:prstGeom prst="rect">
+            <a:avLst/>
+          </a:prstGeom>
+          <a:solidFill>
+            <a:schemeClr val="bg1"/>
+          </a:solidFill>
+          <a:ln>
+            <a:solidFill>
+              <a:srgbClr val="000000"/>
+            </a:solidFill>
+          </a:ln>
+        </p:spPr>
+        <p:style>
+          <a:lnRef idx="2">
+            <a:schemeClr val="accent1">
+              <a:shade val="50000"/>
+            </a:schemeClr>
+          </a:lnRef>
+          <a:fillRef idx="1">
+            <a:schemeClr val="accent1"/>
+          </a:fillRef>
+          <a:effectRef idx="0">
+            <a:schemeClr val="accent1"/>
+          </a:effectRef>
+          <a:fontRef idx="minor"/>
+        </p:style>
+        <p:txBody>
+          <a:bodyPr lIns="90000" rIns="90000" tIns="45000" bIns="45000" anchor="ctr">
+            <a:noAutofit/>
+          </a:bodyPr>
+          <a:p>
+            <a:pPr algn="ctr">
+              <a:lnSpc>
+                <a:spcPct val="100000"/>
+              </a:lnSpc>
+            </a:pPr>
+            <a:r>
+              <a:rPr b="1" lang="en-US" sz="1800" spc="-1" strike="noStrike">
+                <a:solidFill>
+                  <a:srgbClr val="4472c4"/>
+                </a:solidFill>
+                <a:latin typeface="Arial"/>
+                <a:ea typeface="DejaVu Sans"/>
+              </a:rPr>
+              <a:t>10 05 b2 b7</a:t>
+            </a:r>
+            <a:endParaRPr b="0" lang="en-US" sz="1800" spc="-1" strike="noStrike">
+              <a:latin typeface="Arial"/>
+            </a:endParaRPr>
+          </a:p>
+        </p:txBody>
+      </p:sp>
+      <p:sp>
+        <p:nvSpPr>
+          <p:cNvPr id="68" name="Text Box 11_4"/>
+          <p:cNvSpPr/>
+          <p:nvPr/>
+        </p:nvSpPr>
+        <p:spPr>
+          <a:xfrm>
+            <a:off x="3960000" y="180000"/>
+            <a:ext cx="5540040" cy="363960"/>
+          </a:xfrm>
+          <a:prstGeom prst="rect">
+            <a:avLst/>
+          </a:prstGeom>
+          <a:noFill/>
+          <a:ln w="0">
+            <a:noFill/>
+          </a:ln>
+        </p:spPr>
+        <p:style>
+          <a:lnRef idx="0"/>
+          <a:fillRef idx="0"/>
+          <a:effectRef idx="0"/>
+          <a:fontRef idx="minor"/>
+        </p:style>
+        <p:txBody>
+          <a:bodyPr lIns="90000" rIns="90000" tIns="45000" bIns="45000">
+            <a:spAutoFit/>
+          </a:bodyPr>
+          <a:p>
+            <a:pPr>
+              <a:lnSpc>
+                <a:spcPct val="100000"/>
+              </a:lnSpc>
+            </a:pPr>
+            <a:r>
+              <a:rPr b="0" lang="en-US" sz="1800" spc="-1" strike="noStrike">
+                <a:solidFill>
+                  <a:srgbClr val="000000"/>
+                </a:solidFill>
+                <a:latin typeface="Arial"/>
+                <a:ea typeface="DejaVu Sans"/>
+              </a:rPr>
+              <a:t>0x556835b4 getbuf</a:t>
+            </a:r>
+            <a:r>
+              <a:rPr b="0" lang="zh-CN" sz="1800" spc="-1" strike="noStrike">
+                <a:solidFill>
+                  <a:srgbClr val="000000"/>
+                </a:solidFill>
+                <a:latin typeface="Arial"/>
+                <a:ea typeface="DejaVu Sans"/>
+              </a:rPr>
+              <a:t>执行</a:t>
+            </a:r>
+            <a:r>
+              <a:rPr b="0" lang="en-US" sz="1800" spc="-1" strike="noStrike">
+                <a:solidFill>
+                  <a:srgbClr val="000000"/>
+                </a:solidFill>
+                <a:latin typeface="Arial"/>
+                <a:ea typeface="DejaVu Sans"/>
+              </a:rPr>
+              <a:t>ret</a:t>
+            </a:r>
+            <a:r>
+              <a:rPr b="0" lang="zh-CN" sz="1800" spc="-1" strike="noStrike">
+                <a:solidFill>
+                  <a:srgbClr val="000000"/>
+                </a:solidFill>
+                <a:latin typeface="Arial"/>
+                <a:ea typeface="DejaVu Sans"/>
+              </a:rPr>
+              <a:t>时的栈顶</a:t>
+            </a:r>
+            <a:r>
+              <a:rPr b="0" lang="en-US" sz="1800" spc="-1" strike="noStrike">
+                <a:solidFill>
+                  <a:srgbClr val="000000"/>
+                </a:solidFill>
+                <a:latin typeface="Arial"/>
+                <a:ea typeface="DejaVu Sans"/>
+              </a:rPr>
+              <a:t>+8</a:t>
+            </a:r>
+            <a:r>
+              <a:rPr b="0" lang="zh-CN" sz="1800" spc="-1" strike="noStrike">
+                <a:solidFill>
+                  <a:srgbClr val="000000"/>
+                </a:solidFill>
+                <a:latin typeface="Arial"/>
+                <a:ea typeface="DejaVu Sans"/>
+              </a:rPr>
+              <a:t>位置   </a:t>
             </a:r>
             <a:endParaRPr b="0" lang="en-US" sz="1800" spc="-1" strike="noStrike">
               <a:latin typeface="Arial"/>

</xml_diff>

<commit_message>
finish task3 in buffer lab.
</commit_message>
<xml_diff>
--- a/my-solution/4-Buffer-Lab-IA32/buflab32-handout/buflab-handout/stackVisual.pptx
+++ b/my-solution/4-Buffer-Lab-IA32/buflab32-handout/buflab-handout/stackVisual.pptx
@@ -7,6 +7,7 @@
   <p:sldIdLst>
     <p:sldId id="256" r:id="rId3"/>
     <p:sldId id="257" r:id="rId4"/>
+    <p:sldId id="258" r:id="rId5"/>
   </p:sldIdLst>
   <p:sldSz cx="10080625" cy="5670550"/>
   <p:notesSz cx="7559675" cy="10691812"/>
@@ -65,7 +66,7 @@
         <p:spPr>
           <a:xfrm>
             <a:off x="504000" y="226080"/>
-            <a:ext cx="9071280" cy="946080"/>
+            <a:ext cx="9070920" cy="945720"/>
           </a:xfrm>
           <a:prstGeom prst="rect">
             <a:avLst/>
@@ -96,7 +97,7 @@
         <p:spPr>
           <a:xfrm>
             <a:off x="504000" y="1326600"/>
-            <a:ext cx="9072000" cy="1568520"/>
+            <a:ext cx="9071640" cy="1568160"/>
           </a:xfrm>
           <a:prstGeom prst="rect">
             <a:avLst/>
@@ -125,8 +126,8 @@
         </p:nvSpPr>
         <p:spPr>
           <a:xfrm>
-            <a:off x="504000" y="3044520"/>
-            <a:ext cx="9072000" cy="1568520"/>
+            <a:off x="504000" y="3044160"/>
+            <a:ext cx="9071640" cy="1568160"/>
           </a:xfrm>
           <a:prstGeom prst="rect">
             <a:avLst/>
@@ -178,7 +179,7 @@
         <p:spPr>
           <a:xfrm>
             <a:off x="504000" y="226080"/>
-            <a:ext cx="9071280" cy="946080"/>
+            <a:ext cx="9070920" cy="945720"/>
           </a:xfrm>
           <a:prstGeom prst="rect">
             <a:avLst/>
@@ -209,7 +210,7 @@
         <p:spPr>
           <a:xfrm>
             <a:off x="504000" y="1326600"/>
-            <a:ext cx="4426920" cy="1568520"/>
+            <a:ext cx="4426920" cy="1568160"/>
           </a:xfrm>
           <a:prstGeom prst="rect">
             <a:avLst/>
@@ -239,7 +240,7 @@
         <p:spPr>
           <a:xfrm>
             <a:off x="5152680" y="1326600"/>
-            <a:ext cx="4426920" cy="1568520"/>
+            <a:ext cx="4426920" cy="1568160"/>
           </a:xfrm>
           <a:prstGeom prst="rect">
             <a:avLst/>
@@ -268,8 +269,8 @@
         </p:nvSpPr>
         <p:spPr>
           <a:xfrm>
-            <a:off x="504000" y="3044520"/>
-            <a:ext cx="4426920" cy="1568520"/>
+            <a:off x="504000" y="3044160"/>
+            <a:ext cx="4426920" cy="1568160"/>
           </a:xfrm>
           <a:prstGeom prst="rect">
             <a:avLst/>
@@ -298,8 +299,8 @@
         </p:nvSpPr>
         <p:spPr>
           <a:xfrm>
-            <a:off x="5152680" y="3044520"/>
-            <a:ext cx="4426920" cy="1568520"/>
+            <a:off x="5152680" y="3044160"/>
+            <a:ext cx="4426920" cy="1568160"/>
           </a:xfrm>
           <a:prstGeom prst="rect">
             <a:avLst/>
@@ -351,7 +352,7 @@
         <p:spPr>
           <a:xfrm>
             <a:off x="504000" y="226080"/>
-            <a:ext cx="9071280" cy="946080"/>
+            <a:ext cx="9070920" cy="945720"/>
           </a:xfrm>
           <a:prstGeom prst="rect">
             <a:avLst/>
@@ -382,7 +383,7 @@
         <p:spPr>
           <a:xfrm>
             <a:off x="504000" y="1326600"/>
-            <a:ext cx="2921040" cy="1568520"/>
+            <a:ext cx="2920680" cy="1568160"/>
           </a:xfrm>
           <a:prstGeom prst="rect">
             <a:avLst/>
@@ -411,8 +412,8 @@
         </p:nvSpPr>
         <p:spPr>
           <a:xfrm>
-            <a:off x="3571560" y="1326600"/>
-            <a:ext cx="2921040" cy="1568520"/>
+            <a:off x="3571200" y="1326600"/>
+            <a:ext cx="2920680" cy="1568160"/>
           </a:xfrm>
           <a:prstGeom prst="rect">
             <a:avLst/>
@@ -441,8 +442,8 @@
         </p:nvSpPr>
         <p:spPr>
           <a:xfrm>
-            <a:off x="6639120" y="1326600"/>
-            <a:ext cx="2921040" cy="1568520"/>
+            <a:off x="6638040" y="1326600"/>
+            <a:ext cx="2920680" cy="1568160"/>
           </a:xfrm>
           <a:prstGeom prst="rect">
             <a:avLst/>
@@ -471,8 +472,8 @@
         </p:nvSpPr>
         <p:spPr>
           <a:xfrm>
-            <a:off x="504000" y="3044520"/>
-            <a:ext cx="2921040" cy="1568520"/>
+            <a:off x="504000" y="3044160"/>
+            <a:ext cx="2920680" cy="1568160"/>
           </a:xfrm>
           <a:prstGeom prst="rect">
             <a:avLst/>
@@ -501,8 +502,8 @@
         </p:nvSpPr>
         <p:spPr>
           <a:xfrm>
-            <a:off x="3571560" y="3044520"/>
-            <a:ext cx="2921040" cy="1568520"/>
+            <a:off x="3571200" y="3044160"/>
+            <a:ext cx="2920680" cy="1568160"/>
           </a:xfrm>
           <a:prstGeom prst="rect">
             <a:avLst/>
@@ -531,8 +532,8 @@
         </p:nvSpPr>
         <p:spPr>
           <a:xfrm>
-            <a:off x="6639120" y="3044520"/>
-            <a:ext cx="2921040" cy="1568520"/>
+            <a:off x="6638040" y="3044160"/>
+            <a:ext cx="2920680" cy="1568160"/>
           </a:xfrm>
           <a:prstGeom prst="rect">
             <a:avLst/>
@@ -584,7 +585,7 @@
         <p:spPr>
           <a:xfrm>
             <a:off x="504000" y="226080"/>
-            <a:ext cx="9071280" cy="946080"/>
+            <a:ext cx="9070920" cy="945720"/>
           </a:xfrm>
           <a:prstGeom prst="rect">
             <a:avLst/>
@@ -615,7 +616,7 @@
         <p:spPr>
           <a:xfrm>
             <a:off x="504000" y="1326600"/>
-            <a:ext cx="9072000" cy="3288600"/>
+            <a:ext cx="9071640" cy="3288240"/>
           </a:xfrm>
           <a:prstGeom prst="rect">
             <a:avLst/>
@@ -668,7 +669,7 @@
         <p:spPr>
           <a:xfrm>
             <a:off x="504000" y="226080"/>
-            <a:ext cx="9071280" cy="946080"/>
+            <a:ext cx="9070920" cy="945720"/>
           </a:xfrm>
           <a:prstGeom prst="rect">
             <a:avLst/>
@@ -699,7 +700,7 @@
         <p:spPr>
           <a:xfrm>
             <a:off x="504000" y="1326600"/>
-            <a:ext cx="9072000" cy="3288600"/>
+            <a:ext cx="9071640" cy="3288240"/>
           </a:xfrm>
           <a:prstGeom prst="rect">
             <a:avLst/>
@@ -751,7 +752,7 @@
         <p:spPr>
           <a:xfrm>
             <a:off x="504000" y="226080"/>
-            <a:ext cx="9071280" cy="946080"/>
+            <a:ext cx="9070920" cy="945720"/>
           </a:xfrm>
           <a:prstGeom prst="rect">
             <a:avLst/>
@@ -782,7 +783,7 @@
         <p:spPr>
           <a:xfrm>
             <a:off x="504000" y="1326600"/>
-            <a:ext cx="4426920" cy="3288600"/>
+            <a:ext cx="4426920" cy="3288240"/>
           </a:xfrm>
           <a:prstGeom prst="rect">
             <a:avLst/>
@@ -812,7 +813,7 @@
         <p:spPr>
           <a:xfrm>
             <a:off x="5152680" y="1326600"/>
-            <a:ext cx="4426920" cy="3288600"/>
+            <a:ext cx="4426920" cy="3288240"/>
           </a:xfrm>
           <a:prstGeom prst="rect">
             <a:avLst/>
@@ -864,7 +865,7 @@
         <p:spPr>
           <a:xfrm>
             <a:off x="504000" y="226080"/>
-            <a:ext cx="9071280" cy="946080"/>
+            <a:ext cx="9070920" cy="945720"/>
           </a:xfrm>
           <a:prstGeom prst="rect">
             <a:avLst/>
@@ -917,7 +918,7 @@
         <p:spPr>
           <a:xfrm>
             <a:off x="504000" y="226080"/>
-            <a:ext cx="9071280" cy="4386600"/>
+            <a:ext cx="9070920" cy="4385160"/>
           </a:xfrm>
           <a:prstGeom prst="rect">
             <a:avLst/>
@@ -970,7 +971,7 @@
         <p:spPr>
           <a:xfrm>
             <a:off x="504000" y="226080"/>
-            <a:ext cx="9071280" cy="946080"/>
+            <a:ext cx="9070920" cy="945720"/>
           </a:xfrm>
           <a:prstGeom prst="rect">
             <a:avLst/>
@@ -1001,7 +1002,7 @@
         <p:spPr>
           <a:xfrm>
             <a:off x="504000" y="1326600"/>
-            <a:ext cx="4426920" cy="1568520"/>
+            <a:ext cx="4426920" cy="1568160"/>
           </a:xfrm>
           <a:prstGeom prst="rect">
             <a:avLst/>
@@ -1031,7 +1032,7 @@
         <p:spPr>
           <a:xfrm>
             <a:off x="5152680" y="1326600"/>
-            <a:ext cx="4426920" cy="3288600"/>
+            <a:ext cx="4426920" cy="3288240"/>
           </a:xfrm>
           <a:prstGeom prst="rect">
             <a:avLst/>
@@ -1060,8 +1061,8 @@
         </p:nvSpPr>
         <p:spPr>
           <a:xfrm>
-            <a:off x="504000" y="3044520"/>
-            <a:ext cx="4426920" cy="1568520"/>
+            <a:off x="504000" y="3044160"/>
+            <a:ext cx="4426920" cy="1568160"/>
           </a:xfrm>
           <a:prstGeom prst="rect">
             <a:avLst/>
@@ -1113,7 +1114,7 @@
         <p:spPr>
           <a:xfrm>
             <a:off x="504000" y="226080"/>
-            <a:ext cx="9071280" cy="946080"/>
+            <a:ext cx="9070920" cy="945720"/>
           </a:xfrm>
           <a:prstGeom prst="rect">
             <a:avLst/>
@@ -1144,7 +1145,7 @@
         <p:spPr>
           <a:xfrm>
             <a:off x="504000" y="1326600"/>
-            <a:ext cx="4426920" cy="3288600"/>
+            <a:ext cx="4426920" cy="3288240"/>
           </a:xfrm>
           <a:prstGeom prst="rect">
             <a:avLst/>
@@ -1174,7 +1175,7 @@
         <p:spPr>
           <a:xfrm>
             <a:off x="5152680" y="1326600"/>
-            <a:ext cx="4426920" cy="1568520"/>
+            <a:ext cx="4426920" cy="1568160"/>
           </a:xfrm>
           <a:prstGeom prst="rect">
             <a:avLst/>
@@ -1203,8 +1204,8 @@
         </p:nvSpPr>
         <p:spPr>
           <a:xfrm>
-            <a:off x="5152680" y="3044520"/>
-            <a:ext cx="4426920" cy="1568520"/>
+            <a:off x="5152680" y="3044160"/>
+            <a:ext cx="4426920" cy="1568160"/>
           </a:xfrm>
           <a:prstGeom prst="rect">
             <a:avLst/>
@@ -1256,7 +1257,7 @@
         <p:spPr>
           <a:xfrm>
             <a:off x="504000" y="226080"/>
-            <a:ext cx="9071280" cy="946080"/>
+            <a:ext cx="9070920" cy="945720"/>
           </a:xfrm>
           <a:prstGeom prst="rect">
             <a:avLst/>
@@ -1287,7 +1288,7 @@
         <p:spPr>
           <a:xfrm>
             <a:off x="504000" y="1326600"/>
-            <a:ext cx="4426920" cy="1568520"/>
+            <a:ext cx="4426920" cy="1568160"/>
           </a:xfrm>
           <a:prstGeom prst="rect">
             <a:avLst/>
@@ -1317,7 +1318,7 @@
         <p:spPr>
           <a:xfrm>
             <a:off x="5152680" y="1326600"/>
-            <a:ext cx="4426920" cy="1568520"/>
+            <a:ext cx="4426920" cy="1568160"/>
           </a:xfrm>
           <a:prstGeom prst="rect">
             <a:avLst/>
@@ -1346,8 +1347,8 @@
         </p:nvSpPr>
         <p:spPr>
           <a:xfrm>
-            <a:off x="504000" y="3044520"/>
-            <a:ext cx="9072000" cy="1568520"/>
+            <a:off x="504000" y="3044160"/>
+            <a:ext cx="9071640" cy="1568160"/>
           </a:xfrm>
           <a:prstGeom prst="rect">
             <a:avLst/>
@@ -1399,7 +1400,7 @@
         <p:spPr>
           <a:xfrm>
             <a:off x="504000" y="226080"/>
-            <a:ext cx="9071280" cy="946080"/>
+            <a:ext cx="9070920" cy="945720"/>
           </a:xfrm>
           <a:prstGeom prst="rect">
             <a:avLst/>
@@ -1414,7 +1415,25 @@
               <a:rPr b="0" lang="zh-CN" sz="1800" spc="-1" strike="noStrike">
                 <a:latin typeface="Arial"/>
               </a:rPr>
-              <a:t>点击鼠标编辑标题文字格式</a:t>
+              <a:t>点击鼠</a:t>
+            </a:r>
+            <a:r>
+              <a:rPr b="0" lang="zh-CN" sz="1800" spc="-1" strike="noStrike">
+                <a:latin typeface="Arial"/>
+              </a:rPr>
+              <a:t>标编辑</a:t>
+            </a:r>
+            <a:r>
+              <a:rPr b="0" lang="zh-CN" sz="1800" spc="-1" strike="noStrike">
+                <a:latin typeface="Arial"/>
+              </a:rPr>
+              <a:t>标题文</a:t>
+            </a:r>
+            <a:r>
+              <a:rPr b="0" lang="zh-CN" sz="1800" spc="-1" strike="noStrike">
+                <a:latin typeface="Arial"/>
+              </a:rPr>
+              <a:t>字格式</a:t>
             </a:r>
             <a:endParaRPr b="0" lang="en-US" sz="1800" spc="-1" strike="noStrike">
               <a:latin typeface="Arial"/>
@@ -1435,7 +1454,7 @@
         <p:spPr>
           <a:xfrm>
             <a:off x="504000" y="1326600"/>
-            <a:ext cx="9072000" cy="3288600"/>
+            <a:ext cx="9071640" cy="3288240"/>
           </a:xfrm>
           <a:prstGeom prst="rect">
             <a:avLst/>
@@ -1458,12 +1477,12 @@
               <a:buChar char=""/>
             </a:pPr>
             <a:r>
-              <a:rPr b="0" lang="zh-CN" sz="3200" spc="-1" strike="noStrike">
+              <a:rPr b="0" lang="zh-CN" sz="1800" spc="-1" strike="noStrike">
                 <a:latin typeface="Arial"/>
               </a:rPr>
               <a:t>点击鼠标编辑大纲文字格式</a:t>
             </a:r>
-            <a:endParaRPr b="0" lang="en-US" sz="3200" spc="-1" strike="noStrike">
+            <a:endParaRPr b="0" lang="en-US" sz="1800" spc="-1" strike="noStrike">
               <a:latin typeface="Arial"/>
             </a:endParaRPr>
           </a:p>
@@ -1480,12 +1499,12 @@
               <a:buChar char=""/>
             </a:pPr>
             <a:r>
-              <a:rPr b="0" lang="zh-CN" sz="2800" spc="-1" strike="noStrike">
+              <a:rPr b="0" lang="zh-CN" sz="1800" spc="-1" strike="noStrike">
                 <a:latin typeface="Arial"/>
               </a:rPr>
               <a:t>第二个大纲级</a:t>
             </a:r>
-            <a:endParaRPr b="0" lang="en-US" sz="2800" spc="-1" strike="noStrike">
+            <a:endParaRPr b="0" lang="en-US" sz="1800" spc="-1" strike="noStrike">
               <a:latin typeface="Arial"/>
             </a:endParaRPr>
           </a:p>
@@ -1502,12 +1521,12 @@
               <a:buChar char=""/>
             </a:pPr>
             <a:r>
-              <a:rPr b="0" lang="zh-CN" sz="2400" spc="-1" strike="noStrike">
+              <a:rPr b="0" lang="zh-CN" sz="1800" spc="-1" strike="noStrike">
                 <a:latin typeface="Arial"/>
               </a:rPr>
               <a:t>第三大纲级别</a:t>
             </a:r>
-            <a:endParaRPr b="0" lang="en-US" sz="2400" spc="-1" strike="noStrike">
+            <a:endParaRPr b="0" lang="en-US" sz="1800" spc="-1" strike="noStrike">
               <a:latin typeface="Arial"/>
             </a:endParaRPr>
           </a:p>
@@ -1524,12 +1543,12 @@
               <a:buChar char=""/>
             </a:pPr>
             <a:r>
-              <a:rPr b="0" lang="zh-CN" sz="2000" spc="-1" strike="noStrike">
+              <a:rPr b="0" lang="zh-CN" sz="1800" spc="-1" strike="noStrike">
                 <a:latin typeface="Arial"/>
               </a:rPr>
               <a:t>第四大纲级别</a:t>
             </a:r>
-            <a:endParaRPr b="0" lang="en-US" sz="2000" spc="-1" strike="noStrike">
+            <a:endParaRPr b="0" lang="en-US" sz="1800" spc="-1" strike="noStrike">
               <a:latin typeface="Arial"/>
             </a:endParaRPr>
           </a:p>
@@ -1546,12 +1565,12 @@
               <a:buChar char=""/>
             </a:pPr>
             <a:r>
-              <a:rPr b="0" lang="zh-CN" sz="2000" spc="-1" strike="noStrike">
+              <a:rPr b="0" lang="zh-CN" sz="1800" spc="-1" strike="noStrike">
                 <a:latin typeface="Arial"/>
               </a:rPr>
               <a:t>第五大纲级别</a:t>
             </a:r>
-            <a:endParaRPr b="0" lang="en-US" sz="2000" spc="-1" strike="noStrike">
+            <a:endParaRPr b="0" lang="en-US" sz="1800" spc="-1" strike="noStrike">
               <a:latin typeface="Arial"/>
             </a:endParaRPr>
           </a:p>
@@ -1568,12 +1587,12 @@
               <a:buChar char=""/>
             </a:pPr>
             <a:r>
-              <a:rPr b="0" lang="zh-CN" sz="2000" spc="-1" strike="noStrike">
+              <a:rPr b="0" lang="zh-CN" sz="1800" spc="-1" strike="noStrike">
                 <a:latin typeface="Arial"/>
               </a:rPr>
               <a:t>第六大纲级别</a:t>
             </a:r>
-            <a:endParaRPr b="0" lang="en-US" sz="2000" spc="-1" strike="noStrike">
+            <a:endParaRPr b="0" lang="en-US" sz="1800" spc="-1" strike="noStrike">
               <a:latin typeface="Arial"/>
             </a:endParaRPr>
           </a:p>
@@ -1590,12 +1609,12 @@
               <a:buChar char=""/>
             </a:pPr>
             <a:r>
-              <a:rPr b="0" lang="zh-CN" sz="2000" spc="-1" strike="noStrike">
+              <a:rPr b="0" lang="zh-CN" sz="1800" spc="-1" strike="noStrike">
                 <a:latin typeface="Arial"/>
               </a:rPr>
               <a:t>第七大纲级别</a:t>
             </a:r>
-            <a:endParaRPr b="0" lang="en-US" sz="2000" spc="-1" strike="noStrike">
+            <a:endParaRPr b="0" lang="en-US" sz="1800" spc="-1" strike="noStrike">
               <a:latin typeface="Arial"/>
             </a:endParaRPr>
           </a:p>
@@ -1646,8 +1665,8 @@
         </p:nvSpPr>
         <p:spPr>
           <a:xfrm>
-            <a:off x="1980000" y="1848600"/>
-            <a:ext cx="2159640" cy="473400"/>
+            <a:off x="1980720" y="1510560"/>
+            <a:ext cx="2159280" cy="442440"/>
           </a:xfrm>
           <a:prstGeom prst="rect">
             <a:avLst/>
@@ -1719,8 +1738,8 @@
         </p:nvSpPr>
         <p:spPr>
           <a:xfrm>
-            <a:off x="1980000" y="2743920"/>
-            <a:ext cx="2159640" cy="473400"/>
+            <a:off x="1980720" y="2348280"/>
+            <a:ext cx="2159280" cy="442440"/>
           </a:xfrm>
           <a:prstGeom prst="rect">
             <a:avLst/>
@@ -1792,8 +1811,8 @@
         </p:nvSpPr>
         <p:spPr>
           <a:xfrm>
-            <a:off x="1980000" y="2269440"/>
-            <a:ext cx="2159640" cy="473400"/>
+            <a:off x="1980720" y="1904400"/>
+            <a:ext cx="2159280" cy="442440"/>
           </a:xfrm>
           <a:prstGeom prst="rect">
             <a:avLst/>
@@ -1865,8 +1884,8 @@
         </p:nvSpPr>
         <p:spPr>
           <a:xfrm>
-            <a:off x="1980000" y="900000"/>
-            <a:ext cx="2159640" cy="473400"/>
+            <a:off x="1980720" y="623160"/>
+            <a:ext cx="2159280" cy="442440"/>
           </a:xfrm>
           <a:prstGeom prst="rect">
             <a:avLst/>
@@ -1938,8 +1957,8 @@
         </p:nvSpPr>
         <p:spPr>
           <a:xfrm>
-            <a:off x="1980000" y="1374840"/>
-            <a:ext cx="2159640" cy="473400"/>
+            <a:off x="1980720" y="1067400"/>
+            <a:ext cx="2159280" cy="442440"/>
           </a:xfrm>
           <a:prstGeom prst="rect">
             <a:avLst/>
@@ -2011,8 +2030,8 @@
         </p:nvSpPr>
         <p:spPr>
           <a:xfrm>
-            <a:off x="4359600" y="900000"/>
-            <a:ext cx="5540040" cy="363960"/>
+            <a:off x="4360320" y="653760"/>
+            <a:ext cx="5539680" cy="363960"/>
           </a:xfrm>
           <a:prstGeom prst="rect">
             <a:avLst/>
@@ -2072,8 +2091,8 @@
         </p:nvSpPr>
         <p:spPr>
           <a:xfrm>
-            <a:off x="1980000" y="4587120"/>
-            <a:ext cx="2159640" cy="473400"/>
+            <a:off x="1980720" y="4072320"/>
+            <a:ext cx="2159280" cy="442800"/>
           </a:xfrm>
           <a:prstGeom prst="rect">
             <a:avLst/>
@@ -2145,8 +2164,8 @@
         </p:nvSpPr>
         <p:spPr>
           <a:xfrm>
-            <a:off x="1980000" y="4112640"/>
-            <a:ext cx="2159640" cy="473400"/>
+            <a:off x="1980720" y="3628440"/>
+            <a:ext cx="2159280" cy="442800"/>
           </a:xfrm>
           <a:prstGeom prst="rect">
             <a:avLst/>
@@ -2218,8 +2237,8 @@
         </p:nvSpPr>
         <p:spPr>
           <a:xfrm>
-            <a:off x="1980000" y="3218040"/>
-            <a:ext cx="2159640" cy="473400"/>
+            <a:off x="1980720" y="2791800"/>
+            <a:ext cx="2159280" cy="442440"/>
           </a:xfrm>
           <a:prstGeom prst="rect">
             <a:avLst/>
@@ -2291,8 +2310,8 @@
         </p:nvSpPr>
         <p:spPr>
           <a:xfrm>
-            <a:off x="1980000" y="3638880"/>
-            <a:ext cx="2159640" cy="473400"/>
+            <a:off x="1980720" y="3185280"/>
+            <a:ext cx="2159280" cy="442440"/>
           </a:xfrm>
           <a:prstGeom prst="rect">
             <a:avLst/>
@@ -2364,8 +2383,8 @@
         </p:nvSpPr>
         <p:spPr>
           <a:xfrm>
-            <a:off x="4359600" y="1435680"/>
-            <a:ext cx="5540040" cy="363960"/>
+            <a:off x="4360320" y="1080000"/>
+            <a:ext cx="5539680" cy="363960"/>
           </a:xfrm>
           <a:prstGeom prst="rect">
             <a:avLst/>
@@ -2415,8 +2434,8 @@
         </p:nvSpPr>
         <p:spPr>
           <a:xfrm>
-            <a:off x="4320000" y="4675680"/>
-            <a:ext cx="5540040" cy="363960"/>
+            <a:off x="4500000" y="5040000"/>
+            <a:ext cx="5539680" cy="363960"/>
           </a:xfrm>
           <a:prstGeom prst="rect">
             <a:avLst/>
@@ -2450,7 +2469,7 @@
                 <a:latin typeface="Arial"/>
                 <a:ea typeface="DejaVu Sans"/>
               </a:rPr>
-              <a:t>0x556835b0-32 </a:t>
+              <a:t>0x556835b0-40 </a:t>
             </a:r>
             <a:r>
               <a:rPr b="0" lang="zh-CN" sz="1800" spc="-1" strike="noStrike">
@@ -2476,8 +2495,8 @@
         </p:nvSpPr>
         <p:spPr>
           <a:xfrm>
-            <a:off x="1980000" y="426240"/>
-            <a:ext cx="2159640" cy="473400"/>
+            <a:off x="1980720" y="180000"/>
+            <a:ext cx="2159280" cy="442440"/>
           </a:xfrm>
           <a:prstGeom prst="rect">
             <a:avLst/>
@@ -2549,8 +2568,8 @@
         </p:nvSpPr>
         <p:spPr>
           <a:xfrm>
-            <a:off x="4359600" y="535680"/>
-            <a:ext cx="5540040" cy="363960"/>
+            <a:off x="4320000" y="180000"/>
+            <a:ext cx="5539680" cy="363960"/>
           </a:xfrm>
           <a:prstGeom prst="rect">
             <a:avLst/>
@@ -2615,6 +2634,152 @@
                 <a:ea typeface="DejaVu Sans"/>
               </a:rPr>
               <a:t>时的栈顶   </a:t>
+            </a:r>
+            <a:endParaRPr b="0" lang="en-US" sz="1800" spc="-1" strike="noStrike">
+              <a:latin typeface="Arial"/>
+            </a:endParaRPr>
+          </a:p>
+        </p:txBody>
+      </p:sp>
+      <p:sp>
+        <p:nvSpPr>
+          <p:cNvPr id="52" name="Rectangle 4_7"/>
+          <p:cNvSpPr/>
+          <p:nvPr/>
+        </p:nvSpPr>
+        <p:spPr>
+          <a:xfrm>
+            <a:off x="1980720" y="4957560"/>
+            <a:ext cx="2159280" cy="442440"/>
+          </a:xfrm>
+          <a:prstGeom prst="rect">
+            <a:avLst/>
+          </a:prstGeom>
+          <a:solidFill>
+            <a:schemeClr val="bg1"/>
+          </a:solidFill>
+          <a:ln>
+            <a:solidFill>
+              <a:srgbClr val="000000"/>
+            </a:solidFill>
+          </a:ln>
+        </p:spPr>
+        <p:style>
+          <a:lnRef idx="2">
+            <a:schemeClr val="accent1">
+              <a:shade val="50000"/>
+            </a:schemeClr>
+          </a:lnRef>
+          <a:fillRef idx="1">
+            <a:schemeClr val="accent1"/>
+          </a:fillRef>
+          <a:effectRef idx="0">
+            <a:schemeClr val="accent1"/>
+          </a:effectRef>
+          <a:fontRef idx="minor"/>
+        </p:style>
+        <p:txBody>
+          <a:bodyPr lIns="90000" rIns="90000" tIns="45000" bIns="45000" anchor="ctr">
+            <a:noAutofit/>
+          </a:bodyPr>
+          <a:p>
+            <a:pPr algn="ctr">
+              <a:lnSpc>
+                <a:spcPct val="100000"/>
+              </a:lnSpc>
+            </a:pPr>
+            <a:r>
+              <a:rPr b="1" lang="en-US" sz="1800" spc="-1" strike="noStrike">
+                <a:solidFill>
+                  <a:srgbClr val="4472c4"/>
+                </a:solidFill>
+                <a:latin typeface="Arial"/>
+                <a:ea typeface="DejaVu Sans"/>
+              </a:rPr>
+              <a:t> </a:t>
+            </a:r>
+            <a:r>
+              <a:rPr b="1" lang="en-US" sz="1800" spc="-1" strike="noStrike">
+                <a:solidFill>
+                  <a:srgbClr val="4472c4"/>
+                </a:solidFill>
+                <a:latin typeface="Arial"/>
+                <a:ea typeface="DejaVu Sans"/>
+              </a:rPr>
+              <a:t>00 00 00 00</a:t>
+            </a:r>
+            <a:endParaRPr b="0" lang="en-US" sz="1800" spc="-1" strike="noStrike">
+              <a:latin typeface="Arial"/>
+            </a:endParaRPr>
+          </a:p>
+        </p:txBody>
+      </p:sp>
+      <p:sp>
+        <p:nvSpPr>
+          <p:cNvPr id="53" name="Rectangle 5_7"/>
+          <p:cNvSpPr/>
+          <p:nvPr/>
+        </p:nvSpPr>
+        <p:spPr>
+          <a:xfrm>
+            <a:off x="1980720" y="4513680"/>
+            <a:ext cx="2159280" cy="442440"/>
+          </a:xfrm>
+          <a:prstGeom prst="rect">
+            <a:avLst/>
+          </a:prstGeom>
+          <a:solidFill>
+            <a:schemeClr val="bg1"/>
+          </a:solidFill>
+          <a:ln>
+            <a:solidFill>
+              <a:srgbClr val="000000"/>
+            </a:solidFill>
+          </a:ln>
+        </p:spPr>
+        <p:style>
+          <a:lnRef idx="2">
+            <a:schemeClr val="accent1">
+              <a:shade val="50000"/>
+            </a:schemeClr>
+          </a:lnRef>
+          <a:fillRef idx="1">
+            <a:schemeClr val="accent1"/>
+          </a:fillRef>
+          <a:effectRef idx="0">
+            <a:schemeClr val="accent1"/>
+          </a:effectRef>
+          <a:fontRef idx="minor"/>
+        </p:style>
+        <p:txBody>
+          <a:bodyPr lIns="90000" rIns="90000" tIns="45000" bIns="45000" anchor="ctr">
+            <a:noAutofit/>
+          </a:bodyPr>
+          <a:p>
+            <a:pPr algn="ctr">
+              <a:lnSpc>
+                <a:spcPct val="100000"/>
+              </a:lnSpc>
+            </a:pPr>
+            <a:r>
+              <a:rPr b="1" lang="en-US" sz="1800" spc="-1" strike="noStrike">
+                <a:solidFill>
+                  <a:srgbClr val="4472c4"/>
+                </a:solidFill>
+                <a:latin typeface="Arial"/>
+                <a:ea typeface="DejaVu Sans"/>
+              </a:rPr>
+              <a:t> </a:t>
+            </a:r>
+            <a:r>
+              <a:rPr b="1" lang="en-US" sz="1800" spc="-1" strike="noStrike">
+                <a:solidFill>
+                  <a:srgbClr val="4472c4"/>
+                </a:solidFill>
+                <a:latin typeface="Arial"/>
+                <a:ea typeface="DejaVu Sans"/>
+              </a:rPr>
+              <a:t>00 00 00 00</a:t>
             </a:r>
             <a:endParaRPr b="0" lang="en-US" sz="1800" spc="-1" strike="noStrike">
               <a:latin typeface="Arial"/>
@@ -2654,14 +2819,14 @@
       </p:grpSpPr>
       <p:sp>
         <p:nvSpPr>
-          <p:cNvPr id="52" name="Rectangle 3_0"/>
+          <p:cNvPr id="54" name="Rectangle 3_0"/>
           <p:cNvSpPr/>
           <p:nvPr/>
         </p:nvSpPr>
         <p:spPr>
           <a:xfrm>
-            <a:off x="1620360" y="2343600"/>
-            <a:ext cx="2159640" cy="450720"/>
+            <a:off x="1620360" y="2037960"/>
+            <a:ext cx="2159280" cy="389520"/>
           </a:xfrm>
           <a:prstGeom prst="rect">
             <a:avLst/>
@@ -2727,14 +2892,14 @@
       </p:sp>
       <p:sp>
         <p:nvSpPr>
-          <p:cNvPr id="53" name="Rectangle 4_4"/>
+          <p:cNvPr id="55" name="Rectangle 4_4"/>
           <p:cNvSpPr/>
           <p:nvPr/>
         </p:nvSpPr>
         <p:spPr>
           <a:xfrm>
-            <a:off x="1620360" y="3195720"/>
-            <a:ext cx="2159640" cy="450360"/>
+            <a:off x="1620360" y="2774880"/>
+            <a:ext cx="2159280" cy="388800"/>
           </a:xfrm>
           <a:prstGeom prst="rect">
             <a:avLst/>
@@ -2800,14 +2965,14 @@
       </p:sp>
       <p:sp>
         <p:nvSpPr>
-          <p:cNvPr id="54" name="Rectangle 5_4"/>
+          <p:cNvPr id="56" name="Rectangle 5_4"/>
           <p:cNvSpPr/>
           <p:nvPr/>
         </p:nvSpPr>
         <p:spPr>
           <a:xfrm>
-            <a:off x="1620360" y="2744280"/>
-            <a:ext cx="2159640" cy="450360"/>
+            <a:off x="1620360" y="2384640"/>
+            <a:ext cx="2159280" cy="388800"/>
           </a:xfrm>
           <a:prstGeom prst="rect">
             <a:avLst/>
@@ -2873,14 +3038,14 @@
       </p:sp>
       <p:sp>
         <p:nvSpPr>
-          <p:cNvPr id="55" name="Rectangle 6_4"/>
+          <p:cNvPr id="57" name="Rectangle 6_4"/>
           <p:cNvSpPr/>
           <p:nvPr/>
         </p:nvSpPr>
         <p:spPr>
           <a:xfrm>
-            <a:off x="1620360" y="1441080"/>
-            <a:ext cx="2159640" cy="450360"/>
+            <a:off x="1620360" y="1257840"/>
+            <a:ext cx="2159280" cy="389160"/>
           </a:xfrm>
           <a:prstGeom prst="rect">
             <a:avLst/>
@@ -2946,14 +3111,14 @@
       </p:sp>
       <p:sp>
         <p:nvSpPr>
-          <p:cNvPr id="56" name="Rectangle 7_6"/>
+          <p:cNvPr id="58" name="Rectangle 7_6"/>
           <p:cNvSpPr/>
           <p:nvPr/>
         </p:nvSpPr>
         <p:spPr>
           <a:xfrm>
-            <a:off x="1620360" y="1892880"/>
-            <a:ext cx="2159640" cy="450360"/>
+            <a:off x="1620360" y="1648440"/>
+            <a:ext cx="2159280" cy="389160"/>
           </a:xfrm>
           <a:prstGeom prst="rect">
             <a:avLst/>
@@ -3019,14 +3184,14 @@
       </p:sp>
       <p:sp>
         <p:nvSpPr>
-          <p:cNvPr id="57" name="Text Box 11_8"/>
+          <p:cNvPr id="59" name="Text Box 11_8"/>
           <p:cNvSpPr/>
           <p:nvPr/>
         </p:nvSpPr>
         <p:spPr>
           <a:xfrm>
-            <a:off x="3999960" y="1441080"/>
-            <a:ext cx="5540040" cy="363960"/>
+            <a:off x="3964680" y="1322640"/>
+            <a:ext cx="5539680" cy="363960"/>
           </a:xfrm>
           <a:prstGeom prst="rect">
             <a:avLst/>
@@ -3080,14 +3245,14 @@
       </p:sp>
       <p:sp>
         <p:nvSpPr>
-          <p:cNvPr id="58" name="Rectangle 4_5"/>
+          <p:cNvPr id="60" name="Rectangle 4_5"/>
           <p:cNvSpPr/>
           <p:nvPr/>
         </p:nvSpPr>
         <p:spPr>
           <a:xfrm>
-            <a:off x="1620360" y="4949640"/>
-            <a:ext cx="2159640" cy="450360"/>
+            <a:off x="1620360" y="4290840"/>
+            <a:ext cx="2159280" cy="389160"/>
           </a:xfrm>
           <a:prstGeom prst="rect">
             <a:avLst/>
@@ -3153,14 +3318,14 @@
       </p:sp>
       <p:sp>
         <p:nvSpPr>
-          <p:cNvPr id="59" name="Rectangle 5_5"/>
+          <p:cNvPr id="61" name="Rectangle 5_5"/>
           <p:cNvSpPr/>
           <p:nvPr/>
         </p:nvSpPr>
         <p:spPr>
           <a:xfrm>
-            <a:off x="1620360" y="4498200"/>
-            <a:ext cx="2159640" cy="450360"/>
+            <a:off x="1620360" y="3900600"/>
+            <a:ext cx="2159280" cy="389160"/>
           </a:xfrm>
           <a:prstGeom prst="rect">
             <a:avLst/>
@@ -3226,14 +3391,14 @@
       </p:sp>
       <p:sp>
         <p:nvSpPr>
-          <p:cNvPr id="60" name="Rectangle 7_7"/>
+          <p:cNvPr id="62" name="Rectangle 7_7"/>
           <p:cNvSpPr/>
           <p:nvPr/>
         </p:nvSpPr>
         <p:spPr>
           <a:xfrm>
-            <a:off x="1620360" y="3646800"/>
-            <a:ext cx="2159640" cy="450360"/>
+            <a:off x="1620360" y="3164760"/>
+            <a:ext cx="2159280" cy="388800"/>
           </a:xfrm>
           <a:prstGeom prst="rect">
             <a:avLst/>
@@ -3299,14 +3464,14 @@
       </p:sp>
       <p:sp>
         <p:nvSpPr>
-          <p:cNvPr id="61" name="Rectangle 7_8"/>
+          <p:cNvPr id="63" name="Rectangle 7_8"/>
           <p:cNvSpPr/>
           <p:nvPr/>
         </p:nvSpPr>
         <p:spPr>
           <a:xfrm>
-            <a:off x="1620360" y="4047120"/>
-            <a:ext cx="2159640" cy="450720"/>
+            <a:off x="1620360" y="3510720"/>
+            <a:ext cx="2159280" cy="389520"/>
           </a:xfrm>
           <a:prstGeom prst="rect">
             <a:avLst/>
@@ -3372,14 +3537,14 @@
       </p:sp>
       <p:sp>
         <p:nvSpPr>
-          <p:cNvPr id="62" name="Text Box 11_9"/>
+          <p:cNvPr id="64" name="Text Box 11_9"/>
           <p:cNvSpPr/>
           <p:nvPr/>
         </p:nvSpPr>
         <p:spPr>
           <a:xfrm>
-            <a:off x="3999960" y="1950840"/>
-            <a:ext cx="5540040" cy="363960"/>
+            <a:off x="4000320" y="1796040"/>
+            <a:ext cx="5539680" cy="363960"/>
           </a:xfrm>
           <a:prstGeom prst="rect">
             <a:avLst/>
@@ -3423,14 +3588,14 @@
       </p:sp>
       <p:sp>
         <p:nvSpPr>
-          <p:cNvPr id="63" name="Text Box 11_10"/>
+          <p:cNvPr id="65" name="Text Box 11_10"/>
           <p:cNvSpPr/>
           <p:nvPr/>
         </p:nvSpPr>
         <p:spPr>
           <a:xfrm>
             <a:off x="3960360" y="5033880"/>
-            <a:ext cx="5540040" cy="363960"/>
+            <a:ext cx="5539680" cy="363960"/>
           </a:xfrm>
           <a:prstGeom prst="rect">
             <a:avLst/>
@@ -3464,7 +3629,7 @@
                 <a:latin typeface="Arial"/>
                 <a:ea typeface="DejaVu Sans"/>
               </a:rPr>
-              <a:t>0x556835b0-32 </a:t>
+              <a:t>0x556835b0-40 </a:t>
             </a:r>
             <a:r>
               <a:rPr b="0" lang="zh-CN" sz="1800" spc="-1" strike="noStrike">
@@ -3484,14 +3649,14 @@
       </p:sp>
       <p:sp>
         <p:nvSpPr>
-          <p:cNvPr id="64" name="Rectangle 6_5"/>
+          <p:cNvPr id="66" name="Rectangle 6_5"/>
           <p:cNvSpPr/>
           <p:nvPr/>
         </p:nvSpPr>
         <p:spPr>
           <a:xfrm>
-            <a:off x="1620360" y="990360"/>
-            <a:ext cx="2159640" cy="450360"/>
+            <a:off x="1620360" y="868320"/>
+            <a:ext cx="2159280" cy="388800"/>
           </a:xfrm>
           <a:prstGeom prst="rect">
             <a:avLst/>
@@ -3557,14 +3722,14 @@
       </p:sp>
       <p:sp>
         <p:nvSpPr>
-          <p:cNvPr id="65" name="Text Box 11_11"/>
+          <p:cNvPr id="67" name="Text Box 11_11"/>
           <p:cNvSpPr/>
           <p:nvPr/>
         </p:nvSpPr>
         <p:spPr>
           <a:xfrm>
-            <a:off x="3999960" y="1094400"/>
-            <a:ext cx="5540040" cy="638280"/>
+            <a:off x="3960000" y="981720"/>
+            <a:ext cx="5539680" cy="638280"/>
           </a:xfrm>
           <a:prstGeom prst="rect">
             <a:avLst/>
@@ -3658,14 +3823,14 @@
       </p:sp>
       <p:sp>
         <p:nvSpPr>
-          <p:cNvPr id="66" name="Rectangle 6_2"/>
+          <p:cNvPr id="68" name="Rectangle 6_2"/>
           <p:cNvSpPr/>
           <p:nvPr/>
         </p:nvSpPr>
         <p:spPr>
           <a:xfrm>
-            <a:off x="1620360" y="539640"/>
-            <a:ext cx="2159640" cy="450720"/>
+            <a:off x="1620360" y="478440"/>
+            <a:ext cx="2159280" cy="389520"/>
           </a:xfrm>
           <a:prstGeom prst="rect">
             <a:avLst/>
@@ -3731,14 +3896,14 @@
       </p:sp>
       <p:sp>
         <p:nvSpPr>
-          <p:cNvPr id="67" name="Rectangle 6_3"/>
+          <p:cNvPr id="69" name="Rectangle 6_3"/>
           <p:cNvSpPr/>
           <p:nvPr/>
         </p:nvSpPr>
         <p:spPr>
           <a:xfrm>
             <a:off x="1620360" y="89280"/>
-            <a:ext cx="2159640" cy="450360"/>
+            <a:ext cx="2159280" cy="389160"/>
           </a:xfrm>
           <a:prstGeom prst="rect">
             <a:avLst/>
@@ -3794,14 +3959,14 @@
       </p:sp>
       <p:sp>
         <p:nvSpPr>
-          <p:cNvPr id="68" name="Text Box 11_4"/>
+          <p:cNvPr id="70" name="Text Box 11_4"/>
           <p:cNvSpPr/>
           <p:nvPr/>
         </p:nvSpPr>
         <p:spPr>
           <a:xfrm>
-            <a:off x="3960000" y="180000"/>
-            <a:ext cx="5540040" cy="363960"/>
+            <a:off x="4000320" y="176040"/>
+            <a:ext cx="5539680" cy="363960"/>
           </a:xfrm>
           <a:prstGeom prst="rect">
             <a:avLst/>
@@ -3886,6 +4051,1332 @@
                 <a:ea typeface="DejaVu Sans"/>
               </a:rPr>
               <a:t>位置   </a:t>
+            </a:r>
+            <a:endParaRPr b="0" lang="en-US" sz="1800" spc="-1" strike="noStrike">
+              <a:latin typeface="Arial"/>
+            </a:endParaRPr>
+          </a:p>
+        </p:txBody>
+      </p:sp>
+      <p:sp>
+        <p:nvSpPr>
+          <p:cNvPr id="71" name="Rectangle 4_8"/>
+          <p:cNvSpPr/>
+          <p:nvPr/>
+        </p:nvSpPr>
+        <p:spPr>
+          <a:xfrm>
+            <a:off x="1620000" y="5040000"/>
+            <a:ext cx="2159280" cy="360000"/>
+          </a:xfrm>
+          <a:prstGeom prst="rect">
+            <a:avLst/>
+          </a:prstGeom>
+          <a:solidFill>
+            <a:schemeClr val="bg1"/>
+          </a:solidFill>
+          <a:ln>
+            <a:solidFill>
+              <a:srgbClr val="000000"/>
+            </a:solidFill>
+          </a:ln>
+        </p:spPr>
+        <p:style>
+          <a:lnRef idx="2">
+            <a:schemeClr val="accent1">
+              <a:shade val="50000"/>
+            </a:schemeClr>
+          </a:lnRef>
+          <a:fillRef idx="1">
+            <a:schemeClr val="accent1"/>
+          </a:fillRef>
+          <a:effectRef idx="0">
+            <a:schemeClr val="accent1"/>
+          </a:effectRef>
+          <a:fontRef idx="minor"/>
+        </p:style>
+        <p:txBody>
+          <a:bodyPr lIns="90000" rIns="90000" tIns="45000" bIns="45000" anchor="ctr">
+            <a:noAutofit/>
+          </a:bodyPr>
+          <a:p>
+            <a:pPr algn="ctr">
+              <a:lnSpc>
+                <a:spcPct val="100000"/>
+              </a:lnSpc>
+            </a:pPr>
+            <a:r>
+              <a:rPr b="1" lang="en-US" sz="1800" spc="-1" strike="noStrike">
+                <a:solidFill>
+                  <a:srgbClr val="4472c4"/>
+                </a:solidFill>
+                <a:latin typeface="Arial"/>
+                <a:ea typeface="DejaVu Sans"/>
+              </a:rPr>
+              <a:t> </a:t>
+            </a:r>
+            <a:r>
+              <a:rPr b="1" lang="en-US" sz="1800" spc="-1" strike="noStrike">
+                <a:solidFill>
+                  <a:srgbClr val="4472c4"/>
+                </a:solidFill>
+                <a:latin typeface="Arial"/>
+                <a:ea typeface="DejaVu Sans"/>
+              </a:rPr>
+              <a:t>00 00 00 00</a:t>
+            </a:r>
+            <a:endParaRPr b="0" lang="en-US" sz="1800" spc="-1" strike="noStrike">
+              <a:latin typeface="Arial"/>
+            </a:endParaRPr>
+          </a:p>
+        </p:txBody>
+      </p:sp>
+      <p:sp>
+        <p:nvSpPr>
+          <p:cNvPr id="72" name="Rectangle 5_8"/>
+          <p:cNvSpPr/>
+          <p:nvPr/>
+        </p:nvSpPr>
+        <p:spPr>
+          <a:xfrm>
+            <a:off x="1620000" y="4680000"/>
+            <a:ext cx="2159280" cy="360000"/>
+          </a:xfrm>
+          <a:prstGeom prst="rect">
+            <a:avLst/>
+          </a:prstGeom>
+          <a:solidFill>
+            <a:schemeClr val="bg1"/>
+          </a:solidFill>
+          <a:ln>
+            <a:solidFill>
+              <a:srgbClr val="000000"/>
+            </a:solidFill>
+          </a:ln>
+        </p:spPr>
+        <p:style>
+          <a:lnRef idx="2">
+            <a:schemeClr val="accent1">
+              <a:shade val="50000"/>
+            </a:schemeClr>
+          </a:lnRef>
+          <a:fillRef idx="1">
+            <a:schemeClr val="accent1"/>
+          </a:fillRef>
+          <a:effectRef idx="0">
+            <a:schemeClr val="accent1"/>
+          </a:effectRef>
+          <a:fontRef idx="minor"/>
+        </p:style>
+        <p:txBody>
+          <a:bodyPr lIns="90000" rIns="90000" tIns="45000" bIns="45000" anchor="ctr">
+            <a:noAutofit/>
+          </a:bodyPr>
+          <a:p>
+            <a:pPr algn="ctr">
+              <a:lnSpc>
+                <a:spcPct val="100000"/>
+              </a:lnSpc>
+            </a:pPr>
+            <a:r>
+              <a:rPr b="1" lang="en-US" sz="1800" spc="-1" strike="noStrike">
+                <a:solidFill>
+                  <a:srgbClr val="4472c4"/>
+                </a:solidFill>
+                <a:latin typeface="Arial"/>
+                <a:ea typeface="DejaVu Sans"/>
+              </a:rPr>
+              <a:t> </a:t>
+            </a:r>
+            <a:r>
+              <a:rPr b="1" lang="en-US" sz="1800" spc="-1" strike="noStrike">
+                <a:solidFill>
+                  <a:srgbClr val="4472c4"/>
+                </a:solidFill>
+                <a:latin typeface="Arial"/>
+                <a:ea typeface="DejaVu Sans"/>
+              </a:rPr>
+              <a:t>00 00 00 00</a:t>
+            </a:r>
+            <a:endParaRPr b="0" lang="en-US" sz="1800" spc="-1" strike="noStrike">
+              <a:latin typeface="Arial"/>
+            </a:endParaRPr>
+          </a:p>
+        </p:txBody>
+      </p:sp>
+    </p:spTree>
+  </p:cSld>
+  <mc:AlternateContent>
+    <mc:Choice Requires="p14">
+      <p:transition spd="slow" p14:dur="2000"/>
+    </mc:Choice>
+    <mc:Fallback>
+      <p:transition spd="slow"/>
+    </mc:Fallback>
+  </mc:AlternateContent>
+</p:sld>
+</file>
+
+<file path=ppt/slides/slide3.xml><?xml version="1.0" encoding="utf-8"?>
+<p:sld xmlns:a="http://schemas.openxmlformats.org/drawingml/2006/main" xmlns:p="http://schemas.openxmlformats.org/presentationml/2006/main" xmlns:r="http://schemas.openxmlformats.org/officeDocument/2006/relationships" xmlns:p14="http://schemas.microsoft.com/office/powerpoint/2010/main" xmlns:p15="http://schemas.microsoft.com/office/powerpoint/2012/main" xmlns:mc="http://schemas.openxmlformats.org/markup-compatibility/2006">
+  <p:cSld>
+    <p:spTree>
+      <p:nvGrpSpPr>
+        <p:cNvPr id="1" name=""/>
+        <p:cNvGrpSpPr/>
+        <p:nvPr/>
+      </p:nvGrpSpPr>
+      <p:grpSpPr>
+        <a:xfrm>
+          <a:off x="0" y="0"/>
+          <a:ext cx="0" cy="0"/>
+          <a:chOff x="0" y="0"/>
+          <a:chExt cx="0" cy="0"/>
+        </a:xfrm>
+      </p:grpSpPr>
+      <p:sp>
+        <p:nvSpPr>
+          <p:cNvPr id="73" name="Rectangle 3_2"/>
+          <p:cNvSpPr/>
+          <p:nvPr/>
+        </p:nvSpPr>
+        <p:spPr>
+          <a:xfrm>
+            <a:off x="1620720" y="1577880"/>
+            <a:ext cx="2159280" cy="450360"/>
+          </a:xfrm>
+          <a:prstGeom prst="rect">
+            <a:avLst/>
+          </a:prstGeom>
+          <a:solidFill>
+            <a:schemeClr val="bg1"/>
+          </a:solidFill>
+          <a:ln>
+            <a:solidFill>
+              <a:srgbClr val="000000"/>
+            </a:solidFill>
+          </a:ln>
+        </p:spPr>
+        <p:style>
+          <a:lnRef idx="2">
+            <a:schemeClr val="accent1">
+              <a:shade val="50000"/>
+            </a:schemeClr>
+          </a:lnRef>
+          <a:fillRef idx="1">
+            <a:schemeClr val="accent1"/>
+          </a:fillRef>
+          <a:effectRef idx="0">
+            <a:schemeClr val="accent1"/>
+          </a:effectRef>
+          <a:fontRef idx="minor"/>
+        </p:style>
+        <p:txBody>
+          <a:bodyPr lIns="90000" rIns="90000" tIns="45000" bIns="45000" anchor="ctr">
+            <a:noAutofit/>
+          </a:bodyPr>
+          <a:p>
+            <a:pPr algn="ctr">
+              <a:lnSpc>
+                <a:spcPct val="100000"/>
+              </a:lnSpc>
+            </a:pPr>
+            <a:r>
+              <a:rPr b="1" lang="en-US" sz="1800" spc="-1" strike="noStrike">
+                <a:solidFill>
+                  <a:srgbClr val="4472c4"/>
+                </a:solidFill>
+                <a:latin typeface="Arial"/>
+                <a:ea typeface="DejaVu Sans"/>
+              </a:rPr>
+              <a:t> </a:t>
+            </a:r>
+            <a:r>
+              <a:rPr b="1" lang="en-US" sz="1800" spc="-1" strike="noStrike">
+                <a:solidFill>
+                  <a:srgbClr val="4472c4"/>
+                </a:solidFill>
+                <a:latin typeface="Arial"/>
+                <a:ea typeface="DejaVu Sans"/>
+              </a:rPr>
+              <a:t>00 00 00 00</a:t>
+            </a:r>
+            <a:endParaRPr b="0" lang="en-US" sz="1800" spc="-1" strike="noStrike">
+              <a:latin typeface="Arial"/>
+            </a:endParaRPr>
+          </a:p>
+        </p:txBody>
+      </p:sp>
+      <p:sp>
+        <p:nvSpPr>
+          <p:cNvPr id="74" name="Rectangle 4_2"/>
+          <p:cNvSpPr/>
+          <p:nvPr/>
+        </p:nvSpPr>
+        <p:spPr>
+          <a:xfrm>
+            <a:off x="1620720" y="2028240"/>
+            <a:ext cx="2159280" cy="450000"/>
+          </a:xfrm>
+          <a:prstGeom prst="rect">
+            <a:avLst/>
+          </a:prstGeom>
+          <a:solidFill>
+            <a:schemeClr val="bg1"/>
+          </a:solidFill>
+          <a:ln>
+            <a:solidFill>
+              <a:srgbClr val="000000"/>
+            </a:solidFill>
+          </a:ln>
+        </p:spPr>
+        <p:style>
+          <a:lnRef idx="2">
+            <a:schemeClr val="accent1">
+              <a:shade val="50000"/>
+            </a:schemeClr>
+          </a:lnRef>
+          <a:fillRef idx="1">
+            <a:schemeClr val="accent1"/>
+          </a:fillRef>
+          <a:effectRef idx="0">
+            <a:schemeClr val="accent1"/>
+          </a:effectRef>
+          <a:fontRef idx="minor"/>
+        </p:style>
+        <p:txBody>
+          <a:bodyPr lIns="90000" rIns="90000" tIns="45000" bIns="45000" anchor="ctr">
+            <a:noAutofit/>
+          </a:bodyPr>
+          <a:p>
+            <a:pPr algn="ctr">
+              <a:lnSpc>
+                <a:spcPct val="100000"/>
+              </a:lnSpc>
+            </a:pPr>
+            <a:r>
+              <a:rPr b="1" lang="en-US" sz="1800" spc="-1" strike="noStrike">
+                <a:solidFill>
+                  <a:srgbClr val="4472c4"/>
+                </a:solidFill>
+                <a:latin typeface="Arial"/>
+                <a:ea typeface="DejaVu Sans"/>
+              </a:rPr>
+              <a:t> </a:t>
+            </a:r>
+            <a:r>
+              <a:rPr b="1" lang="en-US" sz="1800" spc="-1" strike="noStrike">
+                <a:solidFill>
+                  <a:srgbClr val="4472c4"/>
+                </a:solidFill>
+                <a:latin typeface="Arial"/>
+                <a:ea typeface="DejaVu Sans"/>
+              </a:rPr>
+              <a:t>00 00 00 00</a:t>
+            </a:r>
+            <a:endParaRPr b="0" lang="en-US" sz="1800" spc="-1" strike="noStrike">
+              <a:latin typeface="Arial"/>
+            </a:endParaRPr>
+          </a:p>
+        </p:txBody>
+      </p:sp>
+      <p:sp>
+        <p:nvSpPr>
+          <p:cNvPr id="75" name="Rectangle 5_2"/>
+          <p:cNvSpPr/>
+          <p:nvPr/>
+        </p:nvSpPr>
+        <p:spPr>
+          <a:xfrm>
+            <a:off x="1620720" y="2478240"/>
+            <a:ext cx="2159280" cy="450000"/>
+          </a:xfrm>
+          <a:prstGeom prst="rect">
+            <a:avLst/>
+          </a:prstGeom>
+          <a:solidFill>
+            <a:schemeClr val="bg1"/>
+          </a:solidFill>
+          <a:ln>
+            <a:solidFill>
+              <a:srgbClr val="000000"/>
+            </a:solidFill>
+          </a:ln>
+        </p:spPr>
+        <p:style>
+          <a:lnRef idx="2">
+            <a:schemeClr val="accent1">
+              <a:shade val="50000"/>
+            </a:schemeClr>
+          </a:lnRef>
+          <a:fillRef idx="1">
+            <a:schemeClr val="accent1"/>
+          </a:fillRef>
+          <a:effectRef idx="0">
+            <a:schemeClr val="accent1"/>
+          </a:effectRef>
+          <a:fontRef idx="minor"/>
+        </p:style>
+        <p:txBody>
+          <a:bodyPr lIns="90000" rIns="90000" tIns="45000" bIns="45000" anchor="ctr">
+            <a:noAutofit/>
+          </a:bodyPr>
+          <a:p>
+            <a:pPr algn="ctr">
+              <a:lnSpc>
+                <a:spcPct val="100000"/>
+              </a:lnSpc>
+            </a:pPr>
+            <a:r>
+              <a:rPr b="1" lang="en-US" sz="1800" spc="-1" strike="noStrike">
+                <a:solidFill>
+                  <a:srgbClr val="4472c4"/>
+                </a:solidFill>
+                <a:latin typeface="Arial"/>
+                <a:ea typeface="DejaVu Sans"/>
+              </a:rPr>
+              <a:t> </a:t>
+            </a:r>
+            <a:r>
+              <a:rPr b="1" lang="en-US" sz="1800" spc="-1" strike="noStrike">
+                <a:solidFill>
+                  <a:srgbClr val="4472c4"/>
+                </a:solidFill>
+                <a:latin typeface="Arial"/>
+                <a:ea typeface="DejaVu Sans"/>
+              </a:rPr>
+              <a:t>00 00 00 00</a:t>
+            </a:r>
+            <a:endParaRPr b="0" lang="en-US" sz="1800" spc="-1" strike="noStrike">
+              <a:latin typeface="Arial"/>
+            </a:endParaRPr>
+          </a:p>
+        </p:txBody>
+      </p:sp>
+      <p:sp>
+        <p:nvSpPr>
+          <p:cNvPr id="76" name="Rectangle 6_8"/>
+          <p:cNvSpPr/>
+          <p:nvPr/>
+        </p:nvSpPr>
+        <p:spPr>
+          <a:xfrm>
+            <a:off x="1620720" y="675360"/>
+            <a:ext cx="2159280" cy="450000"/>
+          </a:xfrm>
+          <a:prstGeom prst="rect">
+            <a:avLst/>
+          </a:prstGeom>
+          <a:solidFill>
+            <a:schemeClr val="bg1"/>
+          </a:solidFill>
+          <a:ln>
+            <a:solidFill>
+              <a:srgbClr val="000000"/>
+            </a:solidFill>
+          </a:ln>
+        </p:spPr>
+        <p:style>
+          <a:lnRef idx="2">
+            <a:schemeClr val="accent1">
+              <a:shade val="50000"/>
+            </a:schemeClr>
+          </a:lnRef>
+          <a:fillRef idx="1">
+            <a:schemeClr val="accent1"/>
+          </a:fillRef>
+          <a:effectRef idx="0">
+            <a:schemeClr val="accent1"/>
+          </a:effectRef>
+          <a:fontRef idx="minor"/>
+        </p:style>
+        <p:txBody>
+          <a:bodyPr lIns="90000" rIns="90000" tIns="45000" bIns="45000" anchor="ctr">
+            <a:noAutofit/>
+          </a:bodyPr>
+          <a:p>
+            <a:pPr algn="ctr">
+              <a:lnSpc>
+                <a:spcPct val="100000"/>
+              </a:lnSpc>
+            </a:pPr>
+            <a:r>
+              <a:rPr b="1" lang="en-US" sz="1800" spc="-1" strike="noStrike">
+                <a:solidFill>
+                  <a:srgbClr val="4472c4"/>
+                </a:solidFill>
+                <a:latin typeface="Arial"/>
+                <a:ea typeface="DejaVu Sans"/>
+              </a:rPr>
+              <a:t>  </a:t>
+            </a:r>
+            <a:r>
+              <a:rPr b="1" lang="en-US" sz="1800" spc="-1" strike="noStrike">
+                <a:solidFill>
+                  <a:srgbClr val="4472c4"/>
+                </a:solidFill>
+                <a:latin typeface="Arial"/>
+                <a:ea typeface="DejaVu Sans"/>
+              </a:rPr>
+              <a:t>00 00 00 00 </a:t>
+            </a:r>
+            <a:endParaRPr b="0" lang="en-US" sz="1800" spc="-1" strike="noStrike">
+              <a:latin typeface="Arial"/>
+            </a:endParaRPr>
+          </a:p>
+        </p:txBody>
+      </p:sp>
+      <p:sp>
+        <p:nvSpPr>
+          <p:cNvPr id="77" name="Rectangle 7_3"/>
+          <p:cNvSpPr/>
+          <p:nvPr/>
+        </p:nvSpPr>
+        <p:spPr>
+          <a:xfrm>
+            <a:off x="1620720" y="1127160"/>
+            <a:ext cx="2159280" cy="450000"/>
+          </a:xfrm>
+          <a:prstGeom prst="rect">
+            <a:avLst/>
+          </a:prstGeom>
+          <a:solidFill>
+            <a:schemeClr val="bg1"/>
+          </a:solidFill>
+          <a:ln>
+            <a:solidFill>
+              <a:srgbClr val="000000"/>
+            </a:solidFill>
+          </a:ln>
+        </p:spPr>
+        <p:style>
+          <a:lnRef idx="2">
+            <a:schemeClr val="accent1">
+              <a:shade val="50000"/>
+            </a:schemeClr>
+          </a:lnRef>
+          <a:fillRef idx="1">
+            <a:schemeClr val="accent1"/>
+          </a:fillRef>
+          <a:effectRef idx="0">
+            <a:schemeClr val="accent1"/>
+          </a:effectRef>
+          <a:fontRef idx="minor"/>
+        </p:style>
+        <p:txBody>
+          <a:bodyPr lIns="90000" rIns="90000" tIns="45000" bIns="45000" anchor="ctr">
+            <a:noAutofit/>
+          </a:bodyPr>
+          <a:p>
+            <a:pPr algn="ctr">
+              <a:lnSpc>
+                <a:spcPct val="100000"/>
+              </a:lnSpc>
+            </a:pPr>
+            <a:r>
+              <a:rPr b="1" lang="en-US" sz="1800" spc="-1" strike="noStrike">
+                <a:solidFill>
+                  <a:srgbClr val="4472c4"/>
+                </a:solidFill>
+                <a:latin typeface="Arial"/>
+                <a:ea typeface="DejaVu Sans"/>
+              </a:rPr>
+              <a:t> </a:t>
+            </a:r>
+            <a:r>
+              <a:rPr b="1" lang="en-US" sz="1800" spc="-1" strike="noStrike">
+                <a:solidFill>
+                  <a:srgbClr val="4472c4"/>
+                </a:solidFill>
+                <a:latin typeface="Arial"/>
+                <a:ea typeface="DejaVu Sans"/>
+              </a:rPr>
+              <a:t>00 00 00 00</a:t>
+            </a:r>
+            <a:endParaRPr b="0" lang="en-US" sz="1800" spc="-1" strike="noStrike">
+              <a:latin typeface="Arial"/>
+            </a:endParaRPr>
+          </a:p>
+        </p:txBody>
+      </p:sp>
+      <p:sp>
+        <p:nvSpPr>
+          <p:cNvPr id="78" name="Text Box 11_6"/>
+          <p:cNvSpPr/>
+          <p:nvPr/>
+        </p:nvSpPr>
+        <p:spPr>
+          <a:xfrm>
+            <a:off x="4000320" y="720000"/>
+            <a:ext cx="5539680" cy="363960"/>
+          </a:xfrm>
+          <a:prstGeom prst="rect">
+            <a:avLst/>
+          </a:prstGeom>
+          <a:noFill/>
+          <a:ln w="0">
+            <a:noFill/>
+          </a:ln>
+        </p:spPr>
+        <p:style>
+          <a:lnRef idx="0"/>
+          <a:fillRef idx="0"/>
+          <a:effectRef idx="0"/>
+          <a:fontRef idx="minor"/>
+        </p:style>
+        <p:txBody>
+          <a:bodyPr lIns="90000" rIns="90000" tIns="45000" bIns="45000">
+            <a:spAutoFit/>
+          </a:bodyPr>
+          <a:p>
+            <a:pPr>
+              <a:lnSpc>
+                <a:spcPct val="100000"/>
+              </a:lnSpc>
+            </a:pPr>
+            <a:r>
+              <a:rPr b="0" lang="en-US" sz="1800" spc="-1" strike="noStrike">
+                <a:solidFill>
+                  <a:srgbClr val="000000"/>
+                </a:solidFill>
+                <a:latin typeface="Arial"/>
+                <a:ea typeface="DejaVu Sans"/>
+              </a:rPr>
+              <a:t>0x556835b0 getbuf</a:t>
+            </a:r>
+            <a:r>
+              <a:rPr b="0" lang="zh-CN" sz="1800" spc="-1" strike="noStrike">
+                <a:solidFill>
+                  <a:srgbClr val="000000"/>
+                </a:solidFill>
+                <a:latin typeface="Arial"/>
+                <a:ea typeface="DejaVu Sans"/>
+              </a:rPr>
+              <a:t>开始为字符串准备内存时栈顶   </a:t>
+            </a:r>
+            <a:endParaRPr b="0" lang="en-US" sz="1800" spc="-1" strike="noStrike">
+              <a:latin typeface="Arial"/>
+            </a:endParaRPr>
+          </a:p>
+        </p:txBody>
+      </p:sp>
+      <p:sp>
+        <p:nvSpPr>
+          <p:cNvPr id="79" name="Text Box 11_7"/>
+          <p:cNvSpPr/>
+          <p:nvPr/>
+        </p:nvSpPr>
+        <p:spPr>
+          <a:xfrm>
+            <a:off x="4000320" y="1256040"/>
+            <a:ext cx="5539680" cy="363960"/>
+          </a:xfrm>
+          <a:prstGeom prst="rect">
+            <a:avLst/>
+          </a:prstGeom>
+          <a:noFill/>
+          <a:ln w="0">
+            <a:noFill/>
+          </a:ln>
+        </p:spPr>
+        <p:style>
+          <a:lnRef idx="0"/>
+          <a:fillRef idx="0"/>
+          <a:effectRef idx="0"/>
+          <a:fontRef idx="minor"/>
+        </p:style>
+        <p:txBody>
+          <a:bodyPr lIns="90000" rIns="90000" tIns="45000" bIns="45000">
+            <a:spAutoFit/>
+          </a:bodyPr>
+          <a:p>
+            <a:pPr>
+              <a:lnSpc>
+                <a:spcPct val="100000"/>
+              </a:lnSpc>
+            </a:pPr>
+            <a:r>
+              <a:rPr b="0" lang="en-US" sz="1800" spc="-1" strike="noStrike">
+                <a:solidFill>
+                  <a:srgbClr val="000000"/>
+                </a:solidFill>
+                <a:latin typeface="Arial"/>
+                <a:ea typeface="DejaVu Sans"/>
+              </a:rPr>
+              <a:t>0x556835b0-4 </a:t>
+            </a:r>
+            <a:endParaRPr b="0" lang="en-US" sz="1800" spc="-1" strike="noStrike">
+              <a:latin typeface="Arial"/>
+            </a:endParaRPr>
+          </a:p>
+        </p:txBody>
+      </p:sp>
+      <p:sp>
+        <p:nvSpPr>
+          <p:cNvPr id="80" name="Text Box 11_12"/>
+          <p:cNvSpPr/>
+          <p:nvPr/>
+        </p:nvSpPr>
+        <p:spPr>
+          <a:xfrm>
+            <a:off x="3960360" y="5216040"/>
+            <a:ext cx="5539680" cy="363960"/>
+          </a:xfrm>
+          <a:prstGeom prst="rect">
+            <a:avLst/>
+          </a:prstGeom>
+          <a:noFill/>
+          <a:ln w="0">
+            <a:noFill/>
+          </a:ln>
+        </p:spPr>
+        <p:style>
+          <a:lnRef idx="0"/>
+          <a:fillRef idx="0"/>
+          <a:effectRef idx="0"/>
+          <a:fontRef idx="minor"/>
+        </p:style>
+        <p:txBody>
+          <a:bodyPr lIns="90000" rIns="90000" tIns="45000" bIns="45000">
+            <a:spAutoFit/>
+          </a:bodyPr>
+          <a:p>
+            <a:pPr>
+              <a:lnSpc>
+                <a:spcPct val="100000"/>
+              </a:lnSpc>
+            </a:pPr>
+            <a:r>
+              <a:rPr b="0" lang="en-US" sz="1800" spc="-1" strike="noStrike">
+                <a:solidFill>
+                  <a:srgbClr val="000000"/>
+                </a:solidFill>
+                <a:latin typeface="Arial"/>
+                <a:ea typeface="DejaVu Sans"/>
+              </a:rPr>
+              <a:t>0x556835b0-40 </a:t>
+            </a:r>
+            <a:r>
+              <a:rPr b="0" lang="zh-CN" sz="1800" spc="-1" strike="noStrike">
+                <a:solidFill>
+                  <a:srgbClr val="000000"/>
+                </a:solidFill>
+                <a:latin typeface="Arial"/>
+                <a:ea typeface="DejaVu Sans"/>
+              </a:rPr>
+              <a:t>字符串开始输入位置   </a:t>
+            </a:r>
+            <a:endParaRPr b="0" lang="en-US" sz="1800" spc="-1" strike="noStrike">
+              <a:latin typeface="Arial"/>
+            </a:endParaRPr>
+          </a:p>
+        </p:txBody>
+      </p:sp>
+      <p:sp>
+        <p:nvSpPr>
+          <p:cNvPr id="81" name="Rectangle 6_9"/>
+          <p:cNvSpPr/>
+          <p:nvPr/>
+        </p:nvSpPr>
+        <p:spPr>
+          <a:xfrm>
+            <a:off x="1620720" y="224640"/>
+            <a:ext cx="2159280" cy="450000"/>
+          </a:xfrm>
+          <a:prstGeom prst="rect">
+            <a:avLst/>
+          </a:prstGeom>
+          <a:solidFill>
+            <a:schemeClr val="bg1"/>
+          </a:solidFill>
+          <a:ln>
+            <a:solidFill>
+              <a:srgbClr val="000000"/>
+            </a:solidFill>
+          </a:ln>
+        </p:spPr>
+        <p:style>
+          <a:lnRef idx="2">
+            <a:schemeClr val="accent1">
+              <a:shade val="50000"/>
+            </a:schemeClr>
+          </a:lnRef>
+          <a:fillRef idx="1">
+            <a:schemeClr val="accent1"/>
+          </a:fillRef>
+          <a:effectRef idx="0">
+            <a:schemeClr val="accent1"/>
+          </a:effectRef>
+          <a:fontRef idx="minor"/>
+        </p:style>
+        <p:txBody>
+          <a:bodyPr lIns="90000" rIns="90000" tIns="45000" bIns="45000" anchor="ctr">
+            <a:noAutofit/>
+          </a:bodyPr>
+          <a:p>
+            <a:pPr algn="ctr">
+              <a:lnSpc>
+                <a:spcPct val="100000"/>
+              </a:lnSpc>
+            </a:pPr>
+            <a:r>
+              <a:rPr b="1" lang="en-US" sz="1800" spc="-1" strike="noStrike">
+                <a:solidFill>
+                  <a:srgbClr val="4472c4"/>
+                </a:solidFill>
+                <a:latin typeface="Arial"/>
+                <a:ea typeface="DejaVu Sans"/>
+              </a:rPr>
+              <a:t>  </a:t>
+            </a:r>
+            <a:r>
+              <a:rPr b="1" lang="en-US" sz="1800" spc="-1" strike="noStrike">
+                <a:solidFill>
+                  <a:srgbClr val="4472c4"/>
+                </a:solidFill>
+                <a:latin typeface="Arial"/>
+                <a:ea typeface="DejaVu Sans"/>
+              </a:rPr>
+              <a:t>55 68 35 88 </a:t>
+            </a:r>
+            <a:endParaRPr b="0" lang="en-US" sz="1800" spc="-1" strike="noStrike">
+              <a:latin typeface="Arial"/>
+            </a:endParaRPr>
+          </a:p>
+        </p:txBody>
+      </p:sp>
+      <p:sp>
+        <p:nvSpPr>
+          <p:cNvPr id="82" name="Text Box 11_13"/>
+          <p:cNvSpPr/>
+          <p:nvPr/>
+        </p:nvSpPr>
+        <p:spPr>
+          <a:xfrm>
+            <a:off x="4000320" y="180000"/>
+            <a:ext cx="5539680" cy="364680"/>
+          </a:xfrm>
+          <a:prstGeom prst="rect">
+            <a:avLst/>
+          </a:prstGeom>
+          <a:noFill/>
+          <a:ln w="0">
+            <a:noFill/>
+          </a:ln>
+        </p:spPr>
+        <p:style>
+          <a:lnRef idx="0"/>
+          <a:fillRef idx="0"/>
+          <a:effectRef idx="0"/>
+          <a:fontRef idx="minor"/>
+        </p:style>
+        <p:txBody>
+          <a:bodyPr lIns="90000" rIns="90000" tIns="45000" bIns="45000">
+            <a:spAutoFit/>
+          </a:bodyPr>
+          <a:p>
+            <a:pPr>
+              <a:lnSpc>
+                <a:spcPct val="100000"/>
+              </a:lnSpc>
+            </a:pPr>
+            <a:r>
+              <a:rPr b="0" lang="en-US" sz="1800" spc="-1" strike="noStrike">
+                <a:solidFill>
+                  <a:srgbClr val="000000"/>
+                </a:solidFill>
+                <a:latin typeface="Arial"/>
+                <a:ea typeface="DejaVu Sans"/>
+              </a:rPr>
+              <a:t>0x556835b4 getbuf</a:t>
+            </a:r>
+            <a:r>
+              <a:rPr b="0" lang="zh-CN" sz="1800" spc="-1" strike="noStrike">
+                <a:solidFill>
+                  <a:srgbClr val="000000"/>
+                </a:solidFill>
+                <a:latin typeface="Arial"/>
+                <a:ea typeface="DejaVu Sans"/>
+              </a:rPr>
+              <a:t>执行</a:t>
+            </a:r>
+            <a:r>
+              <a:rPr b="0" lang="en-US" sz="1800" spc="-1" strike="noStrike">
+                <a:solidFill>
+                  <a:srgbClr val="000000"/>
+                </a:solidFill>
+                <a:latin typeface="Arial"/>
+                <a:ea typeface="DejaVu Sans"/>
+              </a:rPr>
+              <a:t>ret</a:t>
+            </a:r>
+            <a:r>
+              <a:rPr b="0" lang="zh-CN" sz="1800" spc="-1" strike="noStrike">
+                <a:solidFill>
+                  <a:srgbClr val="000000"/>
+                </a:solidFill>
+                <a:latin typeface="Arial"/>
+                <a:ea typeface="DejaVu Sans"/>
+              </a:rPr>
+              <a:t>时的栈顶，保存地址   </a:t>
+            </a:r>
+            <a:endParaRPr b="0" lang="en-US" sz="1800" spc="-1" strike="noStrike">
+              <a:latin typeface="Arial"/>
+            </a:endParaRPr>
+          </a:p>
+        </p:txBody>
+      </p:sp>
+      <p:sp>
+        <p:nvSpPr>
+          <p:cNvPr id="83" name="Rectangle 4_6"/>
+          <p:cNvSpPr/>
+          <p:nvPr/>
+        </p:nvSpPr>
+        <p:spPr>
+          <a:xfrm>
+            <a:off x="1620720" y="5182200"/>
+            <a:ext cx="2159280" cy="450000"/>
+          </a:xfrm>
+          <a:prstGeom prst="rect">
+            <a:avLst/>
+          </a:prstGeom>
+          <a:solidFill>
+            <a:schemeClr val="bg1"/>
+          </a:solidFill>
+          <a:ln>
+            <a:solidFill>
+              <a:srgbClr val="000000"/>
+            </a:solidFill>
+          </a:ln>
+        </p:spPr>
+        <p:style>
+          <a:lnRef idx="2">
+            <a:schemeClr val="accent1">
+              <a:shade val="50000"/>
+            </a:schemeClr>
+          </a:lnRef>
+          <a:fillRef idx="1">
+            <a:schemeClr val="accent1"/>
+          </a:fillRef>
+          <a:effectRef idx="0">
+            <a:schemeClr val="accent1"/>
+          </a:effectRef>
+          <a:fontRef idx="minor"/>
+        </p:style>
+        <p:txBody>
+          <a:bodyPr lIns="90000" rIns="90000" tIns="45000" bIns="45000" anchor="ctr">
+            <a:noAutofit/>
+          </a:bodyPr>
+          <a:p>
+            <a:pPr algn="ctr">
+              <a:lnSpc>
+                <a:spcPct val="100000"/>
+              </a:lnSpc>
+            </a:pPr>
+            <a:r>
+              <a:rPr b="1" lang="en-US" sz="1800" spc="-1" strike="noStrike">
+                <a:solidFill>
+                  <a:srgbClr val="4472c4"/>
+                </a:solidFill>
+                <a:latin typeface="Arial"/>
+                <a:ea typeface="DejaVu Sans"/>
+              </a:rPr>
+              <a:t>   </a:t>
+            </a:r>
+            <a:r>
+              <a:rPr b="1" lang="en-US" sz="1800" spc="-1" strike="noStrike">
+                <a:solidFill>
+                  <a:srgbClr val="4472c4"/>
+                </a:solidFill>
+                <a:latin typeface="Arial"/>
+                <a:ea typeface="DejaVu Sans"/>
+              </a:rPr>
+              <a:t>04 d1 08 </a:t>
+            </a:r>
+            <a:r>
+              <a:rPr b="1" lang="en-US" sz="1800" spc="-1" strike="noStrike">
+                <a:solidFill>
+                  <a:srgbClr val="4472c4"/>
+                </a:solidFill>
+                <a:latin typeface="Arial"/>
+                <a:ea typeface="DejaVu Sans"/>
+              </a:rPr>
+              <a:t>a1 </a:t>
+            </a:r>
+            <a:endParaRPr b="0" lang="en-US" sz="1800" spc="-1" strike="noStrike">
+              <a:latin typeface="Arial"/>
+            </a:endParaRPr>
+          </a:p>
+        </p:txBody>
+      </p:sp>
+      <p:sp>
+        <p:nvSpPr>
+          <p:cNvPr id="84" name="Rectangle 5_6"/>
+          <p:cNvSpPr/>
+          <p:nvPr/>
+        </p:nvSpPr>
+        <p:spPr>
+          <a:xfrm>
+            <a:off x="1620720" y="4730760"/>
+            <a:ext cx="2159280" cy="450000"/>
+          </a:xfrm>
+          <a:prstGeom prst="rect">
+            <a:avLst/>
+          </a:prstGeom>
+          <a:solidFill>
+            <a:schemeClr val="bg1"/>
+          </a:solidFill>
+          <a:ln>
+            <a:solidFill>
+              <a:srgbClr val="000000"/>
+            </a:solidFill>
+          </a:ln>
+        </p:spPr>
+        <p:style>
+          <a:lnRef idx="2">
+            <a:schemeClr val="accent1">
+              <a:shade val="50000"/>
+            </a:schemeClr>
+          </a:lnRef>
+          <a:fillRef idx="1">
+            <a:schemeClr val="accent1"/>
+          </a:fillRef>
+          <a:effectRef idx="0">
+            <a:schemeClr val="accent1"/>
+          </a:effectRef>
+          <a:fontRef idx="minor"/>
+        </p:style>
+        <p:txBody>
+          <a:bodyPr lIns="90000" rIns="90000" tIns="45000" bIns="45000" anchor="ctr">
+            <a:noAutofit/>
+          </a:bodyPr>
+          <a:p>
+            <a:pPr algn="ctr">
+              <a:lnSpc>
+                <a:spcPct val="100000"/>
+              </a:lnSpc>
+            </a:pPr>
+            <a:r>
+              <a:rPr b="1" lang="en-US" sz="1800" spc="-1" strike="noStrike">
+                <a:solidFill>
+                  <a:srgbClr val="4472c4"/>
+                </a:solidFill>
+                <a:latin typeface="Arial"/>
+                <a:ea typeface="DejaVu Sans"/>
+              </a:rPr>
+              <a:t> </a:t>
+            </a:r>
+            <a:r>
+              <a:rPr b="1" lang="en-US" sz="1800" spc="-1" strike="noStrike">
+                <a:solidFill>
+                  <a:srgbClr val="4472c4"/>
+                </a:solidFill>
+                <a:latin typeface="Arial"/>
+                <a:ea typeface="DejaVu Sans"/>
+              </a:rPr>
+              <a:t>d1</a:t>
+            </a:r>
+            <a:r>
+              <a:rPr b="1" lang="en-US" sz="1800" spc="-1" strike="noStrike">
+                <a:solidFill>
+                  <a:srgbClr val="4472c4"/>
+                </a:solidFill>
+                <a:latin typeface="Arial"/>
+                <a:ea typeface="DejaVu Sans"/>
+              </a:rPr>
+              <a:t> 00 a3 08</a:t>
+            </a:r>
+            <a:endParaRPr b="0" lang="en-US" sz="1800" spc="-1" strike="noStrike">
+              <a:latin typeface="Arial"/>
+            </a:endParaRPr>
+          </a:p>
+        </p:txBody>
+      </p:sp>
+      <p:sp>
+        <p:nvSpPr>
+          <p:cNvPr id="85" name="Rectangle 7_9"/>
+          <p:cNvSpPr/>
+          <p:nvPr/>
+        </p:nvSpPr>
+        <p:spPr>
+          <a:xfrm>
+            <a:off x="1620720" y="3829680"/>
+            <a:ext cx="2159280" cy="450000"/>
+          </a:xfrm>
+          <a:prstGeom prst="rect">
+            <a:avLst/>
+          </a:prstGeom>
+          <a:solidFill>
+            <a:schemeClr val="bg1"/>
+          </a:solidFill>
+          <a:ln>
+            <a:solidFill>
+              <a:srgbClr val="000000"/>
+            </a:solidFill>
+          </a:ln>
+        </p:spPr>
+        <p:style>
+          <a:lnRef idx="2">
+            <a:schemeClr val="accent1">
+              <a:shade val="50000"/>
+            </a:schemeClr>
+          </a:lnRef>
+          <a:fillRef idx="1">
+            <a:schemeClr val="accent1"/>
+          </a:fillRef>
+          <a:effectRef idx="0">
+            <a:schemeClr val="accent1"/>
+          </a:effectRef>
+          <a:fontRef idx="minor"/>
+        </p:style>
+        <p:txBody>
+          <a:bodyPr lIns="90000" rIns="90000" tIns="45000" bIns="45000" anchor="ctr">
+            <a:noAutofit/>
+          </a:bodyPr>
+          <a:p>
+            <a:pPr algn="ctr">
+              <a:lnSpc>
+                <a:spcPct val="100000"/>
+              </a:lnSpc>
+            </a:pPr>
+            <a:r>
+              <a:rPr b="1" lang="en-US" sz="1800" spc="-1" strike="noStrike">
+                <a:solidFill>
+                  <a:srgbClr val="4472c4"/>
+                </a:solidFill>
+                <a:latin typeface="Arial"/>
+                <a:ea typeface="DejaVu Sans"/>
+              </a:rPr>
+              <a:t> </a:t>
+            </a:r>
+            <a:r>
+              <a:rPr b="1" lang="en-US" sz="1800" spc="-1" strike="noStrike">
+                <a:solidFill>
+                  <a:srgbClr val="4472c4"/>
+                </a:solidFill>
+                <a:latin typeface="Arial"/>
+                <a:ea typeface="DejaVu Sans"/>
+              </a:rPr>
+              <a:t>c3 08 04 8c</a:t>
+            </a:r>
+            <a:endParaRPr b="0" lang="en-US" sz="1800" spc="-1" strike="noStrike">
+              <a:latin typeface="Arial"/>
+            </a:endParaRPr>
+          </a:p>
+        </p:txBody>
+      </p:sp>
+      <p:sp>
+        <p:nvSpPr>
+          <p:cNvPr id="86" name="Rectangle 7_10"/>
+          <p:cNvSpPr/>
+          <p:nvPr/>
+        </p:nvSpPr>
+        <p:spPr>
+          <a:xfrm>
+            <a:off x="1620720" y="4279680"/>
+            <a:ext cx="2159280" cy="450360"/>
+          </a:xfrm>
+          <a:prstGeom prst="rect">
+            <a:avLst/>
+          </a:prstGeom>
+          <a:solidFill>
+            <a:schemeClr val="bg1"/>
+          </a:solidFill>
+          <a:ln>
+            <a:solidFill>
+              <a:srgbClr val="000000"/>
+            </a:solidFill>
+          </a:ln>
+        </p:spPr>
+        <p:style>
+          <a:lnRef idx="2">
+            <a:schemeClr val="accent1">
+              <a:shade val="50000"/>
+            </a:schemeClr>
+          </a:lnRef>
+          <a:fillRef idx="1">
+            <a:schemeClr val="accent1"/>
+          </a:fillRef>
+          <a:effectRef idx="0">
+            <a:schemeClr val="accent1"/>
+          </a:effectRef>
+          <a:fontRef idx="minor"/>
+        </p:style>
+        <p:txBody>
+          <a:bodyPr lIns="90000" rIns="90000" tIns="45000" bIns="45000" anchor="ctr">
+            <a:noAutofit/>
+          </a:bodyPr>
+          <a:p>
+            <a:pPr algn="ctr">
+              <a:lnSpc>
+                <a:spcPct val="100000"/>
+              </a:lnSpc>
+            </a:pPr>
+            <a:r>
+              <a:rPr b="1" lang="en-US" sz="1800" spc="-1" strike="noStrike">
+                <a:solidFill>
+                  <a:srgbClr val="4472c4"/>
+                </a:solidFill>
+                <a:latin typeface="Arial"/>
+                <a:ea typeface="DejaVu Sans"/>
+              </a:rPr>
+              <a:t> </a:t>
+            </a:r>
+            <a:r>
+              <a:rPr b="1" lang="en-US" sz="1800" spc="-1" strike="noStrike">
+                <a:solidFill>
+                  <a:srgbClr val="4472c4"/>
+                </a:solidFill>
+                <a:latin typeface="Arial"/>
+                <a:ea typeface="DejaVu Sans"/>
+              </a:rPr>
+              <a:t>9d 68 08 04</a:t>
+            </a:r>
+            <a:endParaRPr b="0" lang="en-US" sz="1800" spc="-1" strike="noStrike">
+              <a:latin typeface="Arial"/>
+            </a:endParaRPr>
+          </a:p>
+        </p:txBody>
+      </p:sp>
+      <p:sp>
+        <p:nvSpPr>
+          <p:cNvPr id="87" name="Rectangle 4_3"/>
+          <p:cNvSpPr/>
+          <p:nvPr/>
+        </p:nvSpPr>
+        <p:spPr>
+          <a:xfrm>
+            <a:off x="1620720" y="3379680"/>
+            <a:ext cx="2159280" cy="450000"/>
+          </a:xfrm>
+          <a:prstGeom prst="rect">
+            <a:avLst/>
+          </a:prstGeom>
+          <a:solidFill>
+            <a:schemeClr val="bg1"/>
+          </a:solidFill>
+          <a:ln>
+            <a:solidFill>
+              <a:srgbClr val="000000"/>
+            </a:solidFill>
+          </a:ln>
+        </p:spPr>
+        <p:style>
+          <a:lnRef idx="2">
+            <a:schemeClr val="accent1">
+              <a:shade val="50000"/>
+            </a:schemeClr>
+          </a:lnRef>
+          <a:fillRef idx="1">
+            <a:schemeClr val="accent1"/>
+          </a:fillRef>
+          <a:effectRef idx="0">
+            <a:schemeClr val="accent1"/>
+          </a:effectRef>
+          <a:fontRef idx="minor"/>
+        </p:style>
+        <p:txBody>
+          <a:bodyPr lIns="90000" rIns="90000" tIns="45000" bIns="45000" anchor="ctr">
+            <a:noAutofit/>
+          </a:bodyPr>
+          <a:p>
+            <a:pPr algn="ctr">
+              <a:lnSpc>
+                <a:spcPct val="100000"/>
+              </a:lnSpc>
+            </a:pPr>
+            <a:r>
+              <a:rPr b="1" lang="en-US" sz="1800" spc="-1" strike="noStrike">
+                <a:solidFill>
+                  <a:srgbClr val="4472c4"/>
+                </a:solidFill>
+                <a:latin typeface="Arial"/>
+                <a:ea typeface="DejaVu Sans"/>
+              </a:rPr>
+              <a:t> </a:t>
+            </a:r>
+            <a:r>
+              <a:rPr b="1" lang="en-US" sz="1800" spc="-1" strike="noStrike">
+                <a:solidFill>
+                  <a:srgbClr val="4472c4"/>
+                </a:solidFill>
+                <a:latin typeface="Arial"/>
+                <a:ea typeface="DejaVu Sans"/>
+              </a:rPr>
+              <a:t>00 00 00 00</a:t>
+            </a:r>
+            <a:endParaRPr b="0" lang="en-US" sz="1800" spc="-1" strike="noStrike">
+              <a:latin typeface="Arial"/>
+            </a:endParaRPr>
+          </a:p>
+        </p:txBody>
+      </p:sp>
+      <p:sp>
+        <p:nvSpPr>
+          <p:cNvPr id="88" name="Rectangle 5_3"/>
+          <p:cNvSpPr/>
+          <p:nvPr/>
+        </p:nvSpPr>
+        <p:spPr>
+          <a:xfrm>
+            <a:off x="1620720" y="2928240"/>
+            <a:ext cx="2159280" cy="450000"/>
+          </a:xfrm>
+          <a:prstGeom prst="rect">
+            <a:avLst/>
+          </a:prstGeom>
+          <a:solidFill>
+            <a:schemeClr val="bg1"/>
+          </a:solidFill>
+          <a:ln>
+            <a:solidFill>
+              <a:srgbClr val="000000"/>
+            </a:solidFill>
+          </a:ln>
+        </p:spPr>
+        <p:style>
+          <a:lnRef idx="2">
+            <a:schemeClr val="accent1">
+              <a:shade val="50000"/>
+            </a:schemeClr>
+          </a:lnRef>
+          <a:fillRef idx="1">
+            <a:schemeClr val="accent1"/>
+          </a:fillRef>
+          <a:effectRef idx="0">
+            <a:schemeClr val="accent1"/>
+          </a:effectRef>
+          <a:fontRef idx="minor"/>
+        </p:style>
+        <p:txBody>
+          <a:bodyPr lIns="90000" rIns="90000" tIns="45000" bIns="45000" anchor="ctr">
+            <a:noAutofit/>
+          </a:bodyPr>
+          <a:p>
+            <a:pPr algn="ctr">
+              <a:lnSpc>
+                <a:spcPct val="100000"/>
+              </a:lnSpc>
+            </a:pPr>
+            <a:r>
+              <a:rPr b="1" lang="en-US" sz="1800" spc="-1" strike="noStrike">
+                <a:solidFill>
+                  <a:srgbClr val="4472c4"/>
+                </a:solidFill>
+                <a:latin typeface="Arial"/>
+                <a:ea typeface="DejaVu Sans"/>
+              </a:rPr>
+              <a:t> </a:t>
+            </a:r>
+            <a:r>
+              <a:rPr b="1" lang="en-US" sz="1800" spc="-1" strike="noStrike">
+                <a:solidFill>
+                  <a:srgbClr val="4472c4"/>
+                </a:solidFill>
+                <a:latin typeface="Arial"/>
+                <a:ea typeface="DejaVu Sans"/>
+              </a:rPr>
+              <a:t>00 00 00 00</a:t>
             </a:r>
             <a:endParaRPr b="0" lang="en-US" sz="1800" spc="-1" strike="noStrike">
               <a:latin typeface="Arial"/>

</xml_diff>